<commit_message>
falta as rules, e ver se queremos imagens nos slides
</commit_message>
<xml_diff>
--- a/Parte_2/DataMining.pptx
+++ b/Parte_2/DataMining.pptx
@@ -5,10 +5,10 @@
     <p:sldMasterId id="2147483648" r:id="rId1"/>
   </p:sldMasterIdLst>
   <p:notesMasterIdLst>
-    <p:notesMasterId r:id="rId23"/>
+    <p:notesMasterId r:id="rId25"/>
   </p:notesMasterIdLst>
   <p:handoutMasterIdLst>
-    <p:handoutMasterId r:id="rId24"/>
+    <p:handoutMasterId r:id="rId26"/>
   </p:handoutMasterIdLst>
   <p:sldIdLst>
     <p:sldId id="271" r:id="rId2"/>
@@ -28,10 +28,12 @@
     <p:sldId id="283" r:id="rId16"/>
     <p:sldId id="297" r:id="rId17"/>
     <p:sldId id="288" r:id="rId18"/>
-    <p:sldId id="289" r:id="rId19"/>
-    <p:sldId id="290" r:id="rId20"/>
-    <p:sldId id="291" r:id="rId21"/>
-    <p:sldId id="293" r:id="rId22"/>
+    <p:sldId id="298" r:id="rId19"/>
+    <p:sldId id="289" r:id="rId20"/>
+    <p:sldId id="290" r:id="rId21"/>
+    <p:sldId id="291" r:id="rId22"/>
+    <p:sldId id="293" r:id="rId23"/>
+    <p:sldId id="299" r:id="rId24"/>
   </p:sldIdLst>
   <p:sldSz cx="12192000" cy="6858000"/>
   <p:notesSz cx="6858000" cy="9144000"/>
@@ -155,7 +157,7 @@
 <file path=ppt/revisionInfo.xml><?xml version="1.0" encoding="utf-8"?>
 <p1510:revInfo xmlns:a="http://schemas.openxmlformats.org/drawingml/2006/main" xmlns:r="http://schemas.openxmlformats.org/officeDocument/2006/relationships" xmlns:p1510="http://schemas.microsoft.com/office/powerpoint/2015/10/main">
   <p1510:revLst>
-    <p1510:client id="{965FDAD3-091D-4772-823C-0F2E48122C99}" v="6507" dt="2022-12-26T01:34:17.597"/>
+    <p1510:client id="{965FDAD3-091D-4772-823C-0F2E48122C99}" v="6509" dt="2022-12-26T17:13:21.256"/>
   </p1510:revLst>
 </p1510:revInfo>
 </file>
@@ -165,7 +167,7 @@
   <pc:docChgLst>
     <pc:chgData name="Paulo Henrique" userId="c679ef514fe8a1b6" providerId="LiveId" clId="{965FDAD3-091D-4772-823C-0F2E48122C99}"/>
     <pc:docChg chg="undo redo custSel addSld delSld modSld sldOrd">
-      <pc:chgData name="Paulo Henrique" userId="c679ef514fe8a1b6" providerId="LiveId" clId="{965FDAD3-091D-4772-823C-0F2E48122C99}" dt="2022-12-26T05:19:01.360" v="16258" actId="20577"/>
+      <pc:chgData name="Paulo Henrique" userId="c679ef514fe8a1b6" providerId="LiveId" clId="{965FDAD3-091D-4772-823C-0F2E48122C99}" dt="2022-12-26T20:21:57.608" v="18505"/>
       <pc:docMkLst>
         <pc:docMk/>
       </pc:docMkLst>
@@ -1157,7 +1159,7 @@
         </pc:picChg>
       </pc:sldChg>
       <pc:sldChg chg="addSp delSp modSp add mod">
-        <pc:chgData name="Paulo Henrique" userId="c679ef514fe8a1b6" providerId="LiveId" clId="{965FDAD3-091D-4772-823C-0F2E48122C99}" dt="2022-12-26T05:19:01.360" v="16258" actId="20577"/>
+        <pc:chgData name="Paulo Henrique" userId="c679ef514fe8a1b6" providerId="LiveId" clId="{965FDAD3-091D-4772-823C-0F2E48122C99}" dt="2022-12-26T16:21:41.099" v="16308" actId="20577"/>
         <pc:sldMkLst>
           <pc:docMk/>
           <pc:sldMk cId="944519702" sldId="297"/>
@@ -1195,10 +1197,56 @@
           </ac:spMkLst>
         </pc:spChg>
         <pc:spChg chg="mod">
-          <ac:chgData name="Paulo Henrique" userId="c679ef514fe8a1b6" providerId="LiveId" clId="{965FDAD3-091D-4772-823C-0F2E48122C99}" dt="2022-12-26T05:19:01.360" v="16258" actId="20577"/>
+          <ac:chgData name="Paulo Henrique" userId="c679ef514fe8a1b6" providerId="LiveId" clId="{965FDAD3-091D-4772-823C-0F2E48122C99}" dt="2022-12-26T16:21:41.099" v="16308" actId="20577"/>
           <ac:spMkLst>
             <pc:docMk/>
             <pc:sldMk cId="944519702" sldId="297"/>
+            <ac:spMk id="9" creationId="{7252E61A-240E-8143-B9AD-A29D0456F0BC}"/>
+          </ac:spMkLst>
+        </pc:spChg>
+      </pc:sldChg>
+      <pc:sldChg chg="modSp add mod">
+        <pc:chgData name="Paulo Henrique" userId="c679ef514fe8a1b6" providerId="LiveId" clId="{965FDAD3-091D-4772-823C-0F2E48122C99}" dt="2022-12-26T17:34:19.137" v="17254" actId="20577"/>
+        <pc:sldMkLst>
+          <pc:docMk/>
+          <pc:sldMk cId="3413676562" sldId="298"/>
+        </pc:sldMkLst>
+        <pc:spChg chg="mod">
+          <ac:chgData name="Paulo Henrique" userId="c679ef514fe8a1b6" providerId="LiveId" clId="{965FDAD3-091D-4772-823C-0F2E48122C99}" dt="2022-12-26T16:20:12.988" v="16301" actId="14100"/>
+          <ac:spMkLst>
+            <pc:docMk/>
+            <pc:sldMk cId="3413676562" sldId="298"/>
+            <ac:spMk id="2" creationId="{00000000-0000-0000-0000-000000000000}"/>
+          </ac:spMkLst>
+        </pc:spChg>
+        <pc:spChg chg="mod">
+          <ac:chgData name="Paulo Henrique" userId="c679ef514fe8a1b6" providerId="LiveId" clId="{965FDAD3-091D-4772-823C-0F2E48122C99}" dt="2022-12-26T17:34:19.137" v="17254" actId="20577"/>
+          <ac:spMkLst>
+            <pc:docMk/>
+            <pc:sldMk cId="3413676562" sldId="298"/>
+            <ac:spMk id="9" creationId="{7252E61A-240E-8143-B9AD-A29D0456F0BC}"/>
+          </ac:spMkLst>
+        </pc:spChg>
+      </pc:sldChg>
+      <pc:sldChg chg="modSp add mod">
+        <pc:chgData name="Paulo Henrique" userId="c679ef514fe8a1b6" providerId="LiveId" clId="{965FDAD3-091D-4772-823C-0F2E48122C99}" dt="2022-12-26T20:21:57.608" v="18505"/>
+        <pc:sldMkLst>
+          <pc:docMk/>
+          <pc:sldMk cId="2107356574" sldId="299"/>
+        </pc:sldMkLst>
+        <pc:spChg chg="mod">
+          <ac:chgData name="Paulo Henrique" userId="c679ef514fe8a1b6" providerId="LiveId" clId="{965FDAD3-091D-4772-823C-0F2E48122C99}" dt="2022-12-26T17:13:30.711" v="16821" actId="20577"/>
+          <ac:spMkLst>
+            <pc:docMk/>
+            <pc:sldMk cId="2107356574" sldId="299"/>
+            <ac:spMk id="2" creationId="{00000000-0000-0000-0000-000000000000}"/>
+          </ac:spMkLst>
+        </pc:spChg>
+        <pc:spChg chg="mod">
+          <ac:chgData name="Paulo Henrique" userId="c679ef514fe8a1b6" providerId="LiveId" clId="{965FDAD3-091D-4772-823C-0F2E48122C99}" dt="2022-12-26T20:21:57.608" v="18505"/>
+          <ac:spMkLst>
+            <pc:docMk/>
+            <pc:sldMk cId="2107356574" sldId="299"/>
             <ac:spMk id="9" creationId="{7252E61A-240E-8143-B9AD-A29D0456F0BC}"/>
           </ac:spMkLst>
         </pc:spChg>
@@ -1290,7 +1338,7 @@
           <a:p>
             <a:fld id="{59041DB8-B66F-4DC8-A96E-33677E0F90FF}" type="datetimeFigureOut">
               <a:rPr lang="en-US" smtClean="0"/>
-              <a:t>12/25/2022</a:t>
+              <a:t>12/26/2022</a:t>
             </a:fld>
             <a:endParaRPr lang="en-US"/>
           </a:p>
@@ -1455,7 +1503,7 @@
           <a:p>
             <a:fld id="{DEB49C4A-65AC-492D-9701-81B46C3AD0E4}" type="datetimeFigureOut">
               <a:rPr lang="en-US" smtClean="0"/>
-              <a:t>12/25/2022</a:t>
+              <a:t>12/26/2022</a:t>
             </a:fld>
             <a:endParaRPr lang="en-US"/>
           </a:p>
@@ -3947,7 +3995,7 @@
           <a:p>
             <a:fld id="{384A29A4-78C8-47AB-BA06-22CB45938951}" type="datetime1">
               <a:rPr lang="en-US" smtClean="0"/>
-              <a:t>12/25/2022</a:t>
+              <a:t>12/26/2022</a:t>
             </a:fld>
             <a:endParaRPr lang="en-US"/>
           </a:p>
@@ -4142,7 +4190,7 @@
           <a:p>
             <a:fld id="{E1ED4ACF-2D82-46F2-A8E9-23963AA34E86}" type="datetime1">
               <a:rPr lang="en-US" smtClean="0"/>
-              <a:t>12/25/2022</a:t>
+              <a:t>12/26/2022</a:t>
             </a:fld>
             <a:endParaRPr lang="en-US"/>
           </a:p>
@@ -4326,7 +4374,7 @@
           <a:p>
             <a:fld id="{AE374B5B-21A0-4192-BF4C-38187F1A68D8}" type="datetime1">
               <a:rPr lang="en-US" smtClean="0"/>
-              <a:t>12/25/2022</a:t>
+              <a:t>12/26/2022</a:t>
             </a:fld>
             <a:endParaRPr lang="en-US"/>
           </a:p>
@@ -6667,7 +6715,7 @@
           <a:p>
             <a:fld id="{33B5CF7C-B333-48E1-A4A6-83A3C8B73AC0}" type="datetime1">
               <a:rPr lang="en-US" smtClean="0"/>
-              <a:t>12/25/2022</a:t>
+              <a:t>12/26/2022</a:t>
             </a:fld>
             <a:endParaRPr lang="en-US"/>
           </a:p>
@@ -7120,7 +7168,7 @@
           <a:p>
             <a:fld id="{AE320762-5CBF-4210-AB54-376B091119F8}" type="datetime1">
               <a:rPr lang="en-US" smtClean="0"/>
-              <a:t>12/25/2022</a:t>
+              <a:t>12/26/2022</a:t>
             </a:fld>
             <a:endParaRPr lang="en-US"/>
           </a:p>
@@ -7252,7 +7300,7 @@
           <a:p>
             <a:fld id="{7F0DB371-BF5F-4058-A212-1A908E4D2674}" type="datetime1">
               <a:rPr lang="en-US" smtClean="0"/>
-              <a:t>12/25/2022</a:t>
+              <a:t>12/26/2022</a:t>
             </a:fld>
             <a:endParaRPr lang="en-US"/>
           </a:p>
@@ -9185,7 +9233,7 @@
           <a:p>
             <a:fld id="{60A4083B-90AA-48CF-BAD5-00AA24D7F288}" type="datetime1">
               <a:rPr lang="en-US" smtClean="0"/>
-              <a:t>12/25/2022</a:t>
+              <a:t>12/26/2022</a:t>
             </a:fld>
             <a:endParaRPr lang="en-US"/>
           </a:p>
@@ -11444,7 +11492,7 @@
             <a:fld id="{F5BAF629-ECA2-4CF3-B790-9D9BDED98269}" type="datetime1">
               <a:rPr lang="en-US" smtClean="0"/>
               <a:pPr/>
-              <a:t>12/25/2022</a:t>
+              <a:t>12/26/2022</a:t>
             </a:fld>
             <a:endParaRPr lang="en-US"/>
           </a:p>
@@ -15739,7 +15787,7 @@
             <a:fld id="{B51B2453-8663-4C69-AF73-9FD7B1DEC5D0}" type="datetime1">
               <a:rPr lang="en-US" smtClean="0"/>
               <a:pPr/>
-              <a:t>12/25/2022</a:t>
+              <a:t>12/26/2022</a:t>
             </a:fld>
             <a:endParaRPr lang="en-US" dirty="0"/>
           </a:p>
@@ -19232,7 +19280,7 @@
           <a:p>
             <a:r>
               <a:rPr lang="pt-PT" dirty="0"/>
-              <a:t>Aqui, encontramos diferenças entre esta rede e a outra, pois os casais da Força Aérea que ganham menos de 50k são mais favorecidos, mas na rede antiga, os casais que possuem mais capital deveriam ser classificados com rendimentos superiores a 50k.</a:t>
+              <a:t>Aqui, encontramos diferenças entre esta rede e a outra, pois os casais da Força Aérea que ganham todos menos de 50k, mas na rede antiga, os casais que possuem mais capital deveriam ser classificados com rendimentos superiores a 50k.</a:t>
             </a:r>
           </a:p>
           <a:p>
@@ -19250,13 +19298,8 @@
           <a:p>
             <a:r>
               <a:rPr lang="pt-PT" dirty="0"/>
-              <a:t>Ao aumentar novamente </a:t>
-            </a:r>
-            <a:r>
-              <a:rPr lang="pt-PT"/>
-              <a:t>o hidden node ratio resulta numa rede menos precisa, aqui começamos a confirmas efeitos negativos de aumentar este parâmetro.</a:t>
-            </a:r>
-            <a:endParaRPr lang="pt-PT" dirty="0"/>
+              <a:t>Ao aumentar novamente o hidden node ratio resulta numa rede menos precisa, aqui começamos a confirmar os efeitos negativos de aumentar muito este parâmetro.</a:t>
+            </a:r>
           </a:p>
         </p:txBody>
       </p:sp>
@@ -19676,29 +19719,19 @@
         </p:nvSpPr>
         <p:spPr>
           <a:xfrm>
-            <a:off x="1289107" y="251670"/>
-            <a:ext cx="9601200" cy="622184"/>
+            <a:off x="1289106" y="251670"/>
+            <a:ext cx="9801139" cy="622184"/>
           </a:xfrm>
         </p:spPr>
         <p:txBody>
-          <a:bodyPr/>
+          <a:bodyPr>
+            <a:normAutofit fontScale="90000"/>
+          </a:bodyPr>
           <a:lstStyle/>
           <a:p>
             <a:r>
-              <a:rPr lang="en-US" dirty="0" err="1"/>
-              <a:t>Análise</a:t>
-            </a:r>
-            <a:r>
               <a:rPr lang="en-US" dirty="0"/>
-              <a:t> de </a:t>
-            </a:r>
-            <a:r>
-              <a:rPr lang="en-US" dirty="0" err="1"/>
-              <a:t>Associação</a:t>
-            </a:r>
-            <a:r>
-              <a:rPr lang="en-US" dirty="0"/>
-              <a:t> – </a:t>
+              <a:t>Logistic Regression Sem Capital – </a:t>
             </a:r>
             <a:r>
               <a:rPr lang="en-US" dirty="0" err="1"/>
@@ -19957,14 +19990,135 @@
             </a:lvl9pPr>
           </a:lstStyle>
           <a:p>
-            <a:endParaRPr lang="pt-PT" dirty="0"/>
+            <a:r>
+              <a:rPr lang="en-US" dirty="0" err="1"/>
+              <a:t>Aqui</a:t>
+            </a:r>
+            <a:r>
+              <a:rPr lang="en-US" dirty="0"/>
+              <a:t> </a:t>
+            </a:r>
+            <a:r>
+              <a:rPr lang="en-US" dirty="0" err="1"/>
+              <a:t>os</a:t>
+            </a:r>
+            <a:r>
+              <a:rPr lang="en-US" dirty="0"/>
+              <a:t> </a:t>
+            </a:r>
+            <a:r>
+              <a:rPr lang="en-US" dirty="0" err="1"/>
+              <a:t>salários</a:t>
+            </a:r>
+            <a:r>
+              <a:rPr lang="en-US" dirty="0"/>
+              <a:t> </a:t>
+            </a:r>
+            <a:r>
+              <a:rPr lang="en-US" dirty="0" err="1"/>
+              <a:t>continuam</a:t>
+            </a:r>
+            <a:r>
+              <a:rPr lang="en-US" dirty="0"/>
+              <a:t> </a:t>
+            </a:r>
+            <a:r>
+              <a:rPr lang="en-US" dirty="0" err="1"/>
+              <a:t>acima</a:t>
+            </a:r>
+            <a:r>
+              <a:rPr lang="en-US" dirty="0"/>
+              <a:t> a 50k para </a:t>
+            </a:r>
+            <a:r>
+              <a:rPr lang="en-US" dirty="0" err="1"/>
+              <a:t>casos</a:t>
+            </a:r>
+            <a:r>
+              <a:rPr lang="en-US" dirty="0"/>
+              <a:t> </a:t>
+            </a:r>
+            <a:r>
+              <a:rPr lang="en-US" dirty="0" err="1"/>
+              <a:t>casados</a:t>
+            </a:r>
+            <a:r>
+              <a:rPr lang="en-US" dirty="0"/>
+              <a:t> </a:t>
+            </a:r>
+            <a:r>
+              <a:rPr lang="en-US" dirty="0" err="1"/>
+              <a:t>nas</a:t>
+            </a:r>
+            <a:r>
+              <a:rPr lang="en-US" dirty="0"/>
+              <a:t> </a:t>
+            </a:r>
+            <a:r>
+              <a:rPr lang="en-US" dirty="0" err="1"/>
+              <a:t>forças</a:t>
+            </a:r>
+            <a:r>
+              <a:rPr lang="en-US" dirty="0"/>
+              <a:t> armadas, que </a:t>
+            </a:r>
+            <a:r>
+              <a:rPr lang="en-US" dirty="0" err="1"/>
+              <a:t>não</a:t>
+            </a:r>
+            <a:r>
+              <a:rPr lang="en-US" dirty="0"/>
+              <a:t> é o que </a:t>
+            </a:r>
+            <a:r>
+              <a:rPr lang="en-US" dirty="0" err="1"/>
+              <a:t>acontece</a:t>
+            </a:r>
+            <a:r>
+              <a:rPr lang="en-US" dirty="0"/>
+              <a:t> </a:t>
+            </a:r>
+            <a:r>
+              <a:rPr lang="en-US" dirty="0" err="1"/>
+              <a:t>noutros</a:t>
+            </a:r>
+            <a:r>
+              <a:rPr lang="en-US" dirty="0"/>
+              <a:t> </a:t>
+            </a:r>
+            <a:r>
+              <a:rPr lang="en-US" dirty="0" err="1"/>
+              <a:t>algoritmos</a:t>
+            </a:r>
+            <a:r>
+              <a:rPr lang="en-US" dirty="0"/>
+              <a:t>.</a:t>
+            </a:r>
+          </a:p>
+          <a:p>
+            <a:r>
+              <a:rPr lang="pt-PT" dirty="0"/>
+              <a:t>Além disso, verificamos que a educação tem um forte impacto na classificação de salários abaixo ou iguais a 50k, pois em casos com educação baixa isso se verificou.</a:t>
+            </a:r>
+          </a:p>
+          <a:p>
+            <a:r>
+              <a:rPr lang="pt-PT" dirty="0"/>
+              <a:t>Como não havia muito a dizer, revertemos a age e hoursperweek para discrete para tentar encontrar algo que salta-se à vista.</a:t>
+            </a:r>
+          </a:p>
+          <a:p>
+            <a:r>
+              <a:rPr lang="pt-PT" dirty="0"/>
+              <a:t>E foi o que aconteceu, em que as horas é que determinavam grande parte da separaçam das classes, havendo casos com muitas horas trabalhadas que faziam igual ou menos de 50k,e casos com relativamente menos horas com salários acima dos 50k.</a:t>
+            </a:r>
           </a:p>
         </p:txBody>
       </p:sp>
     </p:spTree>
     <p:extLst>
       <p:ext uri="{BB962C8B-B14F-4D97-AF65-F5344CB8AC3E}">
-        <p14:creationId xmlns:p14="http://schemas.microsoft.com/office/powerpoint/2010/main" val="1298620108"/>
+        <p14:creationId xmlns:p14="http://schemas.microsoft.com/office/powerpoint/2010/main" val="3413676562"/>
       </p:ext>
     </p:extLst>
   </p:cSld>
@@ -20024,8 +20178,20 @@
           <a:lstStyle/>
           <a:p>
             <a:r>
+              <a:rPr lang="en-US" dirty="0" err="1"/>
+              <a:t>Análise</a:t>
+            </a:r>
+            <a:r>
               <a:rPr lang="en-US" dirty="0"/>
-              <a:t>K-Means – </a:t>
+              <a:t> de </a:t>
+            </a:r>
+            <a:r>
+              <a:rPr lang="en-US" dirty="0" err="1"/>
+              <a:t>Associação</a:t>
+            </a:r>
+            <a:r>
+              <a:rPr lang="en-US" dirty="0"/>
+              <a:t> – </a:t>
             </a:r>
             <a:r>
               <a:rPr lang="en-US" dirty="0" err="1"/>
@@ -20284,33 +20450,6 @@
             </a:lvl9pPr>
           </a:lstStyle>
           <a:p>
-            <a:r>
-              <a:rPr lang="pt-PT" dirty="0"/>
-              <a:t>O método de mineração de cluster é um tipo de técnica de aprendizado de máquina que é usada para agrupar exemplos em conjuntos de dados em grupos (ou clusters) de maneira que os exemplos em um mesmo cluster sejam similares entre si e diferentes dos exemplos em outros clusters. O objetivo do método de mineração de cluster é descobrir padrões ocultos nos dados e agrupar os exemplos de acordo com esses padrões.</a:t>
-            </a:r>
-            <a:endParaRPr lang="en-US" dirty="0"/>
-          </a:p>
-          <a:p>
-            <a:r>
-              <a:rPr lang="pt-PT" dirty="0"/>
-              <a:t>O método de clusterização facilita a visualização de padrões presentes no conjunto de dados, como os casos específicos encontrados no conjunto de dados:</a:t>
-            </a:r>
-          </a:p>
-          <a:p>
-            <a:pPr lvl="1"/>
-            <a:r>
-              <a:rPr lang="pt-PT" dirty="0"/>
-              <a:t>No cluster 10 todos os casos eram acima de 50k, praticamente tudo homem, eram casados, maior parte trabalhava 30 a 40 horas por semana, o seu capitalloss era abaixo de 672, e o capitalgain era 10937 a 17187 e 17817 a 23437, todos eles nunca abaixo de 29 anos.</a:t>
-            </a:r>
-          </a:p>
-          <a:p>
-            <a:pPr lvl="1"/>
-            <a:r>
-              <a:rPr lang="pt-PT" dirty="0"/>
-              <a:t>No cluster 9 verifica-se essencialmente o mesmo, o que muda é o capitalgain para 4687 a 10937.</a:t>
-            </a:r>
-          </a:p>
-          <a:p>
             <a:endParaRPr lang="pt-PT" dirty="0"/>
           </a:p>
         </p:txBody>
@@ -20318,7 +20457,7 @@
     </p:spTree>
     <p:extLst>
       <p:ext uri="{BB962C8B-B14F-4D97-AF65-F5344CB8AC3E}">
-        <p14:creationId xmlns:p14="http://schemas.microsoft.com/office/powerpoint/2010/main" val="3552763502"/>
+        <p14:creationId xmlns:p14="http://schemas.microsoft.com/office/powerpoint/2010/main" val="1298620108"/>
       </p:ext>
     </p:extLst>
   </p:cSld>
@@ -20729,53 +20868,33 @@
             </a:lvl9pPr>
           </a:lstStyle>
           <a:p>
-            <a:pPr lvl="1"/>
             <a:r>
               <a:rPr lang="pt-PT" dirty="0"/>
-              <a:t>O cluster 8 tem uma caso interessente de praticamente 50/50 no salário, continua a ser homens casados, as horas por semana o mesmo de antes, o capitalloss agora varia em todos os valores acima de 672, e o capital gain tudo abaixo de 4687, e a idade era variada.</a:t>
+              <a:t>O método de mineração de cluster é um tipo de técnica de aprendizado de máquina que é usada para agrupar exemplos em conjuntos de dados em grupos (ou clusters) de maneira que os exemplos em um mesmo cluster sejam similares entre si e diferentes dos exemplos em outros clusters. O objetivo do método de mineração de cluster é descobrir padrões ocultos nos dados e agrupar os exemplos de acordo com esses padrões.</a:t>
+            </a:r>
+            <a:endParaRPr lang="en-US" dirty="0"/>
+          </a:p>
+          <a:p>
+            <a:r>
+              <a:rPr lang="pt-PT" dirty="0"/>
+              <a:t>O método de clusterização facilita a visualização de padrões presentes no conjunto de dados, como os casos específicos encontrados no conjunto de dados:</a:t>
             </a:r>
           </a:p>
           <a:p>
             <a:pPr lvl="1"/>
             <a:r>
               <a:rPr lang="pt-PT" dirty="0"/>
-              <a:t>Apartir disso o capitalgain e capitalloss estavam abaixo dos minimos referidos.</a:t>
+              <a:t>No cluster 10 todos os casos eram acima de 50k, praticamente tudo homem, eram casados, maior parte trabalhava 30 a 40 horas por semana, o seu capitalloss era abaixo de 672, e o capitalgain era 10937 a 17187 e 17817 a 23437, todos eles nunca abaixo de 29 anos.</a:t>
             </a:r>
           </a:p>
           <a:p>
             <a:pPr lvl="1"/>
             <a:r>
               <a:rPr lang="pt-PT" dirty="0"/>
-              <a:t>Casos abaixo de 29 anos resultava em salarios quase 100% igual ou abaixo de 50k.</a:t>
+              <a:t>No cluster 9 verifica-se essencialmente o mesmo, o que muda é o capitalgain para 4687 a 10937.</a:t>
             </a:r>
           </a:p>
           <a:p>
-            <a:pPr lvl="1"/>
-            <a:r>
-              <a:rPr lang="pt-PT" dirty="0"/>
-              <a:t>Em casos de percentagem mais elavadas nas mulheres os valores quase sempre resultavam em salarios igual ou abaixo de 50k. Exceto no cluster 5 e 3 que tinham boas profissões.</a:t>
-            </a:r>
-          </a:p>
-          <a:p>
-            <a:pPr lvl="1"/>
-            <a:r>
-              <a:rPr lang="pt-PT" dirty="0"/>
-              <a:t>O cluster 4 tinha caracteriscas parecidas ao 10, exceto ocupação e os capitais, e resultava em alguns casos acima de 50k.</a:t>
-            </a:r>
-          </a:p>
-          <a:p>
-            <a:pPr lvl="1"/>
-            <a:r>
-              <a:rPr lang="pt-PT" dirty="0"/>
-              <a:t>Para perceber melhor torná-mos o capitalgain e capitalloss em discrete, e verificámos que os casos com maoria passavam a ser onde estes inputs estavam a zero, praticamento só homens, com profissão especializado, executivo ou em sales, idades acima dos 30 anos, casados.</a:t>
-            </a:r>
-          </a:p>
-          <a:p>
-            <a:pPr lvl="1"/>
-            <a:endParaRPr lang="pt-PT" dirty="0"/>
-          </a:p>
-          <a:p>
-            <a:pPr lvl="1"/>
             <a:endParaRPr lang="pt-PT" dirty="0"/>
           </a:p>
         </p:txBody>
@@ -20783,7 +20902,7 @@
     </p:spTree>
     <p:extLst>
       <p:ext uri="{BB962C8B-B14F-4D97-AF65-F5344CB8AC3E}">
-        <p14:creationId xmlns:p14="http://schemas.microsoft.com/office/powerpoint/2010/main" val="148593669"/>
+        <p14:creationId xmlns:p14="http://schemas.microsoft.com/office/powerpoint/2010/main" val="3552763502"/>
       </p:ext>
     </p:extLst>
   </p:cSld>
@@ -20852,6 +20971,380 @@
             </a:r>
             <a:r>
               <a:rPr lang="en-US" dirty="0"/>
+              <a:t> Default</a:t>
+            </a:r>
+          </a:p>
+        </p:txBody>
+      </p:sp>
+      <p:sp>
+        <p:nvSpPr>
+          <p:cNvPr id="9" name="Content Placeholder 3">
+            <a:extLst>
+              <a:ext uri="{FF2B5EF4-FFF2-40B4-BE49-F238E27FC236}">
+                <a16:creationId xmlns:a16="http://schemas.microsoft.com/office/drawing/2014/main" id="{7252E61A-240E-8143-B9AD-A29D0456F0BC}"/>
+              </a:ext>
+            </a:extLst>
+          </p:cNvPr>
+          <p:cNvSpPr txBox="1">
+            <a:spLocks/>
+          </p:cNvSpPr>
+          <p:nvPr/>
+        </p:nvSpPr>
+        <p:spPr>
+          <a:xfrm>
+            <a:off x="1290506" y="998290"/>
+            <a:ext cx="9601200" cy="5100506"/>
+          </a:xfrm>
+          <a:prstGeom prst="rect">
+            <a:avLst/>
+          </a:prstGeom>
+        </p:spPr>
+        <p:txBody>
+          <a:bodyPr vert="horz" lIns="91440" tIns="45720" rIns="91440" bIns="45720" rtlCol="0">
+            <a:normAutofit/>
+          </a:bodyPr>
+          <a:lstStyle>
+            <a:lvl1pPr marL="228600" indent="-228600" algn="l" defTabSz="914400" rtl="0" eaLnBrk="1" latinLnBrk="0" hangingPunct="1">
+              <a:lnSpc>
+                <a:spcPct val="90000"/>
+              </a:lnSpc>
+              <a:spcBef>
+                <a:spcPts val="1800"/>
+              </a:spcBef>
+              <a:buClr>
+                <a:schemeClr val="accent1">
+                  <a:lumMod val="75000"/>
+                </a:schemeClr>
+              </a:buClr>
+              <a:buSzPct val="100000"/>
+              <a:buFont typeface="Arial" pitchFamily="34" charset="0"/>
+              <a:buChar char="▪"/>
+              <a:defRPr sz="2000" kern="1200">
+                <a:solidFill>
+                  <a:schemeClr val="tx1"/>
+                </a:solidFill>
+                <a:latin typeface="+mn-lt"/>
+                <a:ea typeface="+mn-ea"/>
+                <a:cs typeface="+mn-cs"/>
+              </a:defRPr>
+            </a:lvl1pPr>
+            <a:lvl2pPr marL="457200" indent="-182880" algn="l" defTabSz="914400" rtl="0" eaLnBrk="1" latinLnBrk="0" hangingPunct="1">
+              <a:lnSpc>
+                <a:spcPct val="90000"/>
+              </a:lnSpc>
+              <a:spcBef>
+                <a:spcPts val="1200"/>
+              </a:spcBef>
+              <a:buClr>
+                <a:schemeClr val="accent1">
+                  <a:lumMod val="75000"/>
+                </a:schemeClr>
+              </a:buClr>
+              <a:buSzPct val="100000"/>
+              <a:buFont typeface="Arial" pitchFamily="34" charset="0"/>
+              <a:buChar char="▪"/>
+              <a:defRPr sz="1800" kern="1200">
+                <a:solidFill>
+                  <a:schemeClr val="tx1"/>
+                </a:solidFill>
+                <a:latin typeface="+mn-lt"/>
+                <a:ea typeface="+mn-ea"/>
+                <a:cs typeface="+mn-cs"/>
+              </a:defRPr>
+            </a:lvl2pPr>
+            <a:lvl3pPr marL="685800" indent="-179388" algn="l" defTabSz="914400" rtl="0" eaLnBrk="1" latinLnBrk="0" hangingPunct="1">
+              <a:lnSpc>
+                <a:spcPct val="90000"/>
+              </a:lnSpc>
+              <a:spcBef>
+                <a:spcPts val="800"/>
+              </a:spcBef>
+              <a:buClr>
+                <a:schemeClr val="accent1">
+                  <a:lumMod val="75000"/>
+                </a:schemeClr>
+              </a:buClr>
+              <a:buSzPct val="100000"/>
+              <a:buFont typeface="Arial" pitchFamily="34" charset="0"/>
+              <a:buChar char="▪"/>
+              <a:defRPr sz="1600" kern="1200">
+                <a:solidFill>
+                  <a:schemeClr val="tx1"/>
+                </a:solidFill>
+                <a:latin typeface="+mn-lt"/>
+                <a:ea typeface="+mn-ea"/>
+                <a:cs typeface="+mn-cs"/>
+              </a:defRPr>
+            </a:lvl3pPr>
+            <a:lvl4pPr marL="914400" indent="-182880" algn="l" defTabSz="914400" rtl="0" eaLnBrk="1" latinLnBrk="0" hangingPunct="1">
+              <a:lnSpc>
+                <a:spcPct val="90000"/>
+              </a:lnSpc>
+              <a:spcBef>
+                <a:spcPts val="800"/>
+              </a:spcBef>
+              <a:buClr>
+                <a:schemeClr val="accent1">
+                  <a:lumMod val="75000"/>
+                </a:schemeClr>
+              </a:buClr>
+              <a:buSzPct val="100000"/>
+              <a:buFont typeface="Arial" pitchFamily="34" charset="0"/>
+              <a:buChar char="▪"/>
+              <a:defRPr sz="1400" kern="1200">
+                <a:solidFill>
+                  <a:schemeClr val="tx1"/>
+                </a:solidFill>
+                <a:latin typeface="+mn-lt"/>
+                <a:ea typeface="+mn-ea"/>
+                <a:cs typeface="+mn-cs"/>
+              </a:defRPr>
+            </a:lvl4pPr>
+            <a:lvl5pPr marL="1143000" indent="-179388" algn="l" defTabSz="914400" rtl="0" eaLnBrk="1" latinLnBrk="0" hangingPunct="1">
+              <a:lnSpc>
+                <a:spcPct val="90000"/>
+              </a:lnSpc>
+              <a:spcBef>
+                <a:spcPts val="600"/>
+              </a:spcBef>
+              <a:buClr>
+                <a:schemeClr val="accent1">
+                  <a:lumMod val="75000"/>
+                </a:schemeClr>
+              </a:buClr>
+              <a:buSzPct val="100000"/>
+              <a:buFont typeface="Arial" pitchFamily="34" charset="0"/>
+              <a:buChar char="▪"/>
+              <a:defRPr sz="1400" kern="1200">
+                <a:solidFill>
+                  <a:schemeClr val="tx1"/>
+                </a:solidFill>
+                <a:latin typeface="+mn-lt"/>
+                <a:ea typeface="+mn-ea"/>
+                <a:cs typeface="+mn-cs"/>
+              </a:defRPr>
+            </a:lvl5pPr>
+            <a:lvl6pPr marL="1371600" indent="-182880" algn="l" defTabSz="914400" rtl="0" eaLnBrk="1" latinLnBrk="0" hangingPunct="1">
+              <a:lnSpc>
+                <a:spcPct val="90000"/>
+              </a:lnSpc>
+              <a:spcBef>
+                <a:spcPts val="600"/>
+              </a:spcBef>
+              <a:buClr>
+                <a:schemeClr val="accent1">
+                  <a:lumMod val="75000"/>
+                </a:schemeClr>
+              </a:buClr>
+              <a:buSzPct val="100000"/>
+              <a:buFont typeface="Arial" pitchFamily="34" charset="0"/>
+              <a:buChar char="▪"/>
+              <a:defRPr sz="1400" kern="1200">
+                <a:solidFill>
+                  <a:schemeClr val="tx1"/>
+                </a:solidFill>
+                <a:latin typeface="+mn-lt"/>
+                <a:ea typeface="+mn-ea"/>
+                <a:cs typeface="+mn-cs"/>
+              </a:defRPr>
+            </a:lvl6pPr>
+            <a:lvl7pPr marL="1600200" indent="-179388" algn="l" defTabSz="914400" rtl="0" eaLnBrk="1" latinLnBrk="0" hangingPunct="1">
+              <a:lnSpc>
+                <a:spcPct val="90000"/>
+              </a:lnSpc>
+              <a:spcBef>
+                <a:spcPts val="600"/>
+              </a:spcBef>
+              <a:buClr>
+                <a:schemeClr val="accent1">
+                  <a:lumMod val="75000"/>
+                </a:schemeClr>
+              </a:buClr>
+              <a:buSzPct val="100000"/>
+              <a:buFont typeface="Arial" pitchFamily="34" charset="0"/>
+              <a:buChar char="▪"/>
+              <a:defRPr sz="1400" kern="1200">
+                <a:solidFill>
+                  <a:schemeClr val="tx1"/>
+                </a:solidFill>
+                <a:latin typeface="+mn-lt"/>
+                <a:ea typeface="+mn-ea"/>
+                <a:cs typeface="+mn-cs"/>
+              </a:defRPr>
+            </a:lvl7pPr>
+            <a:lvl8pPr marL="1828800" indent="-182880" algn="l" defTabSz="914400" rtl="0" eaLnBrk="1" latinLnBrk="0" hangingPunct="1">
+              <a:lnSpc>
+                <a:spcPct val="90000"/>
+              </a:lnSpc>
+              <a:spcBef>
+                <a:spcPts val="600"/>
+              </a:spcBef>
+              <a:buClr>
+                <a:schemeClr val="accent1">
+                  <a:lumMod val="75000"/>
+                </a:schemeClr>
+              </a:buClr>
+              <a:buSzPct val="100000"/>
+              <a:buFont typeface="Arial" pitchFamily="34" charset="0"/>
+              <a:buChar char="▪"/>
+              <a:defRPr sz="1400" kern="1200">
+                <a:solidFill>
+                  <a:schemeClr val="tx1"/>
+                </a:solidFill>
+                <a:latin typeface="+mn-lt"/>
+                <a:ea typeface="+mn-ea"/>
+                <a:cs typeface="+mn-cs"/>
+              </a:defRPr>
+            </a:lvl8pPr>
+            <a:lvl9pPr marL="1878012" indent="0" algn="l" defTabSz="914400" rtl="0" eaLnBrk="1" latinLnBrk="0" hangingPunct="1">
+              <a:lnSpc>
+                <a:spcPct val="90000"/>
+              </a:lnSpc>
+              <a:spcBef>
+                <a:spcPts val="600"/>
+              </a:spcBef>
+              <a:buClr>
+                <a:schemeClr val="accent1">
+                  <a:lumMod val="75000"/>
+                </a:schemeClr>
+              </a:buClr>
+              <a:buSzPct val="100000"/>
+              <a:buFont typeface="Arial" pitchFamily="34" charset="0"/>
+              <a:buNone/>
+              <a:defRPr sz="1400" kern="1200">
+                <a:solidFill>
+                  <a:schemeClr val="tx1"/>
+                </a:solidFill>
+                <a:latin typeface="+mn-lt"/>
+                <a:ea typeface="+mn-ea"/>
+                <a:cs typeface="+mn-cs"/>
+              </a:defRPr>
+            </a:lvl9pPr>
+          </a:lstStyle>
+          <a:p>
+            <a:pPr lvl="1"/>
+            <a:r>
+              <a:rPr lang="pt-PT" dirty="0"/>
+              <a:t>O cluster 8 tem uma caso interessente de praticamente 50/50 no salário, continua a ser homens casados, as horas por semana o mesmo de antes, o capitalloss agora varia em todos os valores acima de 672, e o capital gain tudo abaixo de 4687, e a idade era variada.</a:t>
+            </a:r>
+          </a:p>
+          <a:p>
+            <a:pPr lvl="1"/>
+            <a:r>
+              <a:rPr lang="pt-PT" dirty="0"/>
+              <a:t>Apartir disso o capitalgain e capitalloss estavam abaixo dos minimos referidos.</a:t>
+            </a:r>
+          </a:p>
+          <a:p>
+            <a:pPr lvl="1"/>
+            <a:r>
+              <a:rPr lang="pt-PT" dirty="0"/>
+              <a:t>Casos abaixo de 29 anos resultava em salarios quase 100% igual ou abaixo de 50k.</a:t>
+            </a:r>
+          </a:p>
+          <a:p>
+            <a:pPr lvl="1"/>
+            <a:r>
+              <a:rPr lang="pt-PT" dirty="0"/>
+              <a:t>Em casos de percentagem mais elavadas nas mulheres os valores quase sempre resultavam em salarios igual ou abaixo de 50k. Exceto no cluster 5 e 3 que tinham boas profissões.</a:t>
+            </a:r>
+          </a:p>
+          <a:p>
+            <a:pPr lvl="1"/>
+            <a:r>
+              <a:rPr lang="pt-PT" dirty="0"/>
+              <a:t>O cluster 4 tinha caracteriscas parecidas ao 10, exceto ocupação e os capitais, e resultava em alguns casos acima de 50k.</a:t>
+            </a:r>
+          </a:p>
+          <a:p>
+            <a:pPr lvl="1"/>
+            <a:r>
+              <a:rPr lang="pt-PT" dirty="0"/>
+              <a:t>Para perceber melhor torná-mos o capitalgain e capitalloss em discrete, e verificámos que os casos com maoria passavam a ser onde estes inputs estavam a zero, praticamento só homens, com profissão especializado, executivo ou em sales, idades acima dos 30 anos, casados.</a:t>
+            </a:r>
+          </a:p>
+          <a:p>
+            <a:pPr lvl="1"/>
+            <a:endParaRPr lang="pt-PT" dirty="0"/>
+          </a:p>
+          <a:p>
+            <a:pPr lvl="1"/>
+            <a:endParaRPr lang="pt-PT" dirty="0"/>
+          </a:p>
+        </p:txBody>
+      </p:sp>
+    </p:spTree>
+    <p:extLst>
+      <p:ext uri="{BB962C8B-B14F-4D97-AF65-F5344CB8AC3E}">
+        <p14:creationId xmlns:p14="http://schemas.microsoft.com/office/powerpoint/2010/main" val="148593669"/>
+      </p:ext>
+    </p:extLst>
+  </p:cSld>
+  <p:clrMapOvr>
+    <a:masterClrMapping/>
+  </p:clrMapOvr>
+  <mc:AlternateContent xmlns:mc="http://schemas.openxmlformats.org/markup-compatibility/2006" xmlns:p14="http://schemas.microsoft.com/office/powerpoint/2010/main">
+    <mc:Choice Requires="p14">
+      <p:transition spd="med" p14:dur="700">
+        <p:fade/>
+      </p:transition>
+    </mc:Choice>
+    <mc:Fallback xmlns="">
+      <p:transition spd="med">
+        <p:fade/>
+      </p:transition>
+    </mc:Fallback>
+  </mc:AlternateContent>
+</p:sld>
+</file>
+
+<file path=ppt/slides/slide22.xml><?xml version="1.0" encoding="utf-8"?>
+<p:sld xmlns:a="http://schemas.openxmlformats.org/drawingml/2006/main" xmlns:r="http://schemas.openxmlformats.org/officeDocument/2006/relationships" xmlns:p="http://schemas.openxmlformats.org/presentationml/2006/main">
+  <p:cSld>
+    <p:spTree>
+      <p:nvGrpSpPr>
+        <p:cNvPr id="1" name=""/>
+        <p:cNvGrpSpPr/>
+        <p:nvPr/>
+      </p:nvGrpSpPr>
+      <p:grpSpPr>
+        <a:xfrm>
+          <a:off x="0" y="0"/>
+          <a:ext cx="0" cy="0"/>
+          <a:chOff x="0" y="0"/>
+          <a:chExt cx="0" cy="0"/>
+        </a:xfrm>
+      </p:grpSpPr>
+      <p:sp>
+        <p:nvSpPr>
+          <p:cNvPr id="2" name="Title 1"/>
+          <p:cNvSpPr>
+            <a:spLocks noGrp="1"/>
+          </p:cNvSpPr>
+          <p:nvPr>
+            <p:ph type="title"/>
+          </p:nvPr>
+        </p:nvSpPr>
+        <p:spPr>
+          <a:xfrm>
+            <a:off x="1289107" y="251670"/>
+            <a:ext cx="9601200" cy="622184"/>
+          </a:xfrm>
+        </p:spPr>
+        <p:txBody>
+          <a:bodyPr/>
+          <a:lstStyle/>
+          <a:p>
+            <a:r>
+              <a:rPr lang="en-US" dirty="0"/>
+              <a:t>K-Means – </a:t>
+            </a:r>
+            <a:r>
+              <a:rPr lang="en-US" dirty="0" err="1"/>
+              <a:t>Parâmetros</a:t>
+            </a:r>
+            <a:r>
+              <a:rPr lang="en-US" dirty="0"/>
               <a:t> </a:t>
             </a:r>
             <a:r>
@@ -21141,6 +21634,368 @@
     <p:extLst>
       <p:ext uri="{BB962C8B-B14F-4D97-AF65-F5344CB8AC3E}">
         <p14:creationId xmlns:p14="http://schemas.microsoft.com/office/powerpoint/2010/main" val="3999899323"/>
+      </p:ext>
+    </p:extLst>
+  </p:cSld>
+  <p:clrMapOvr>
+    <a:masterClrMapping/>
+  </p:clrMapOvr>
+  <mc:AlternateContent xmlns:mc="http://schemas.openxmlformats.org/markup-compatibility/2006" xmlns:p14="http://schemas.microsoft.com/office/powerpoint/2010/main">
+    <mc:Choice Requires="p14">
+      <p:transition spd="med" p14:dur="700">
+        <p:fade/>
+      </p:transition>
+    </mc:Choice>
+    <mc:Fallback xmlns="">
+      <p:transition spd="med">
+        <p:fade/>
+      </p:transition>
+    </mc:Fallback>
+  </mc:AlternateContent>
+</p:sld>
+</file>
+
+<file path=ppt/slides/slide23.xml><?xml version="1.0" encoding="utf-8"?>
+<p:sld xmlns:a="http://schemas.openxmlformats.org/drawingml/2006/main" xmlns:r="http://schemas.openxmlformats.org/officeDocument/2006/relationships" xmlns:p="http://schemas.openxmlformats.org/presentationml/2006/main">
+  <p:cSld>
+    <p:spTree>
+      <p:nvGrpSpPr>
+        <p:cNvPr id="1" name=""/>
+        <p:cNvGrpSpPr/>
+        <p:nvPr/>
+      </p:nvGrpSpPr>
+      <p:grpSpPr>
+        <a:xfrm>
+          <a:off x="0" y="0"/>
+          <a:ext cx="0" cy="0"/>
+          <a:chOff x="0" y="0"/>
+          <a:chExt cx="0" cy="0"/>
+        </a:xfrm>
+      </p:grpSpPr>
+      <p:sp>
+        <p:nvSpPr>
+          <p:cNvPr id="2" name="Title 1"/>
+          <p:cNvSpPr>
+            <a:spLocks noGrp="1"/>
+          </p:cNvSpPr>
+          <p:nvPr>
+            <p:ph type="title"/>
+          </p:nvPr>
+        </p:nvSpPr>
+        <p:spPr>
+          <a:xfrm>
+            <a:off x="1289107" y="251670"/>
+            <a:ext cx="9601200" cy="622184"/>
+          </a:xfrm>
+        </p:spPr>
+        <p:txBody>
+          <a:bodyPr/>
+          <a:lstStyle/>
+          <a:p>
+            <a:r>
+              <a:rPr lang="en-US" dirty="0"/>
+              <a:t>K-Means Sem Capital – </a:t>
+            </a:r>
+            <a:r>
+              <a:rPr lang="en-US" dirty="0" err="1"/>
+              <a:t>Parâmetros</a:t>
+            </a:r>
+            <a:r>
+              <a:rPr lang="en-US" dirty="0"/>
+              <a:t> </a:t>
+            </a:r>
+            <a:r>
+              <a:rPr lang="en-US" dirty="0" err="1"/>
+              <a:t>Alterados</a:t>
+            </a:r>
+            <a:endParaRPr lang="en-US" dirty="0"/>
+          </a:p>
+        </p:txBody>
+      </p:sp>
+      <p:sp>
+        <p:nvSpPr>
+          <p:cNvPr id="9" name="Content Placeholder 3">
+            <a:extLst>
+              <a:ext uri="{FF2B5EF4-FFF2-40B4-BE49-F238E27FC236}">
+                <a16:creationId xmlns:a16="http://schemas.microsoft.com/office/drawing/2014/main" id="{7252E61A-240E-8143-B9AD-A29D0456F0BC}"/>
+              </a:ext>
+            </a:extLst>
+          </p:cNvPr>
+          <p:cNvSpPr txBox="1">
+            <a:spLocks/>
+          </p:cNvSpPr>
+          <p:nvPr/>
+        </p:nvSpPr>
+        <p:spPr>
+          <a:xfrm>
+            <a:off x="1290506" y="998290"/>
+            <a:ext cx="9601200" cy="5100506"/>
+          </a:xfrm>
+          <a:prstGeom prst="rect">
+            <a:avLst/>
+          </a:prstGeom>
+        </p:spPr>
+        <p:txBody>
+          <a:bodyPr vert="horz" lIns="91440" tIns="45720" rIns="91440" bIns="45720" rtlCol="0">
+            <a:normAutofit/>
+          </a:bodyPr>
+          <a:lstStyle>
+            <a:lvl1pPr marL="228600" indent="-228600" algn="l" defTabSz="914400" rtl="0" eaLnBrk="1" latinLnBrk="0" hangingPunct="1">
+              <a:lnSpc>
+                <a:spcPct val="90000"/>
+              </a:lnSpc>
+              <a:spcBef>
+                <a:spcPts val="1800"/>
+              </a:spcBef>
+              <a:buClr>
+                <a:schemeClr val="accent1">
+                  <a:lumMod val="75000"/>
+                </a:schemeClr>
+              </a:buClr>
+              <a:buSzPct val="100000"/>
+              <a:buFont typeface="Arial" pitchFamily="34" charset="0"/>
+              <a:buChar char="▪"/>
+              <a:defRPr sz="2000" kern="1200">
+                <a:solidFill>
+                  <a:schemeClr val="tx1"/>
+                </a:solidFill>
+                <a:latin typeface="+mn-lt"/>
+                <a:ea typeface="+mn-ea"/>
+                <a:cs typeface="+mn-cs"/>
+              </a:defRPr>
+            </a:lvl1pPr>
+            <a:lvl2pPr marL="457200" indent="-182880" algn="l" defTabSz="914400" rtl="0" eaLnBrk="1" latinLnBrk="0" hangingPunct="1">
+              <a:lnSpc>
+                <a:spcPct val="90000"/>
+              </a:lnSpc>
+              <a:spcBef>
+                <a:spcPts val="1200"/>
+              </a:spcBef>
+              <a:buClr>
+                <a:schemeClr val="accent1">
+                  <a:lumMod val="75000"/>
+                </a:schemeClr>
+              </a:buClr>
+              <a:buSzPct val="100000"/>
+              <a:buFont typeface="Arial" pitchFamily="34" charset="0"/>
+              <a:buChar char="▪"/>
+              <a:defRPr sz="1800" kern="1200">
+                <a:solidFill>
+                  <a:schemeClr val="tx1"/>
+                </a:solidFill>
+                <a:latin typeface="+mn-lt"/>
+                <a:ea typeface="+mn-ea"/>
+                <a:cs typeface="+mn-cs"/>
+              </a:defRPr>
+            </a:lvl2pPr>
+            <a:lvl3pPr marL="685800" indent="-179388" algn="l" defTabSz="914400" rtl="0" eaLnBrk="1" latinLnBrk="0" hangingPunct="1">
+              <a:lnSpc>
+                <a:spcPct val="90000"/>
+              </a:lnSpc>
+              <a:spcBef>
+                <a:spcPts val="800"/>
+              </a:spcBef>
+              <a:buClr>
+                <a:schemeClr val="accent1">
+                  <a:lumMod val="75000"/>
+                </a:schemeClr>
+              </a:buClr>
+              <a:buSzPct val="100000"/>
+              <a:buFont typeface="Arial" pitchFamily="34" charset="0"/>
+              <a:buChar char="▪"/>
+              <a:defRPr sz="1600" kern="1200">
+                <a:solidFill>
+                  <a:schemeClr val="tx1"/>
+                </a:solidFill>
+                <a:latin typeface="+mn-lt"/>
+                <a:ea typeface="+mn-ea"/>
+                <a:cs typeface="+mn-cs"/>
+              </a:defRPr>
+            </a:lvl3pPr>
+            <a:lvl4pPr marL="914400" indent="-182880" algn="l" defTabSz="914400" rtl="0" eaLnBrk="1" latinLnBrk="0" hangingPunct="1">
+              <a:lnSpc>
+                <a:spcPct val="90000"/>
+              </a:lnSpc>
+              <a:spcBef>
+                <a:spcPts val="800"/>
+              </a:spcBef>
+              <a:buClr>
+                <a:schemeClr val="accent1">
+                  <a:lumMod val="75000"/>
+                </a:schemeClr>
+              </a:buClr>
+              <a:buSzPct val="100000"/>
+              <a:buFont typeface="Arial" pitchFamily="34" charset="0"/>
+              <a:buChar char="▪"/>
+              <a:defRPr sz="1400" kern="1200">
+                <a:solidFill>
+                  <a:schemeClr val="tx1"/>
+                </a:solidFill>
+                <a:latin typeface="+mn-lt"/>
+                <a:ea typeface="+mn-ea"/>
+                <a:cs typeface="+mn-cs"/>
+              </a:defRPr>
+            </a:lvl4pPr>
+            <a:lvl5pPr marL="1143000" indent="-179388" algn="l" defTabSz="914400" rtl="0" eaLnBrk="1" latinLnBrk="0" hangingPunct="1">
+              <a:lnSpc>
+                <a:spcPct val="90000"/>
+              </a:lnSpc>
+              <a:spcBef>
+                <a:spcPts val="600"/>
+              </a:spcBef>
+              <a:buClr>
+                <a:schemeClr val="accent1">
+                  <a:lumMod val="75000"/>
+                </a:schemeClr>
+              </a:buClr>
+              <a:buSzPct val="100000"/>
+              <a:buFont typeface="Arial" pitchFamily="34" charset="0"/>
+              <a:buChar char="▪"/>
+              <a:defRPr sz="1400" kern="1200">
+                <a:solidFill>
+                  <a:schemeClr val="tx1"/>
+                </a:solidFill>
+                <a:latin typeface="+mn-lt"/>
+                <a:ea typeface="+mn-ea"/>
+                <a:cs typeface="+mn-cs"/>
+              </a:defRPr>
+            </a:lvl5pPr>
+            <a:lvl6pPr marL="1371600" indent="-182880" algn="l" defTabSz="914400" rtl="0" eaLnBrk="1" latinLnBrk="0" hangingPunct="1">
+              <a:lnSpc>
+                <a:spcPct val="90000"/>
+              </a:lnSpc>
+              <a:spcBef>
+                <a:spcPts val="600"/>
+              </a:spcBef>
+              <a:buClr>
+                <a:schemeClr val="accent1">
+                  <a:lumMod val="75000"/>
+                </a:schemeClr>
+              </a:buClr>
+              <a:buSzPct val="100000"/>
+              <a:buFont typeface="Arial" pitchFamily="34" charset="0"/>
+              <a:buChar char="▪"/>
+              <a:defRPr sz="1400" kern="1200">
+                <a:solidFill>
+                  <a:schemeClr val="tx1"/>
+                </a:solidFill>
+                <a:latin typeface="+mn-lt"/>
+                <a:ea typeface="+mn-ea"/>
+                <a:cs typeface="+mn-cs"/>
+              </a:defRPr>
+            </a:lvl6pPr>
+            <a:lvl7pPr marL="1600200" indent="-179388" algn="l" defTabSz="914400" rtl="0" eaLnBrk="1" latinLnBrk="0" hangingPunct="1">
+              <a:lnSpc>
+                <a:spcPct val="90000"/>
+              </a:lnSpc>
+              <a:spcBef>
+                <a:spcPts val="600"/>
+              </a:spcBef>
+              <a:buClr>
+                <a:schemeClr val="accent1">
+                  <a:lumMod val="75000"/>
+                </a:schemeClr>
+              </a:buClr>
+              <a:buSzPct val="100000"/>
+              <a:buFont typeface="Arial" pitchFamily="34" charset="0"/>
+              <a:buChar char="▪"/>
+              <a:defRPr sz="1400" kern="1200">
+                <a:solidFill>
+                  <a:schemeClr val="tx1"/>
+                </a:solidFill>
+                <a:latin typeface="+mn-lt"/>
+                <a:ea typeface="+mn-ea"/>
+                <a:cs typeface="+mn-cs"/>
+              </a:defRPr>
+            </a:lvl7pPr>
+            <a:lvl8pPr marL="1828800" indent="-182880" algn="l" defTabSz="914400" rtl="0" eaLnBrk="1" latinLnBrk="0" hangingPunct="1">
+              <a:lnSpc>
+                <a:spcPct val="90000"/>
+              </a:lnSpc>
+              <a:spcBef>
+                <a:spcPts val="600"/>
+              </a:spcBef>
+              <a:buClr>
+                <a:schemeClr val="accent1">
+                  <a:lumMod val="75000"/>
+                </a:schemeClr>
+              </a:buClr>
+              <a:buSzPct val="100000"/>
+              <a:buFont typeface="Arial" pitchFamily="34" charset="0"/>
+              <a:buChar char="▪"/>
+              <a:defRPr sz="1400" kern="1200">
+                <a:solidFill>
+                  <a:schemeClr val="tx1"/>
+                </a:solidFill>
+                <a:latin typeface="+mn-lt"/>
+                <a:ea typeface="+mn-ea"/>
+                <a:cs typeface="+mn-cs"/>
+              </a:defRPr>
+            </a:lvl8pPr>
+            <a:lvl9pPr marL="1878012" indent="0" algn="l" defTabSz="914400" rtl="0" eaLnBrk="1" latinLnBrk="0" hangingPunct="1">
+              <a:lnSpc>
+                <a:spcPct val="90000"/>
+              </a:lnSpc>
+              <a:spcBef>
+                <a:spcPts val="600"/>
+              </a:spcBef>
+              <a:buClr>
+                <a:schemeClr val="accent1">
+                  <a:lumMod val="75000"/>
+                </a:schemeClr>
+              </a:buClr>
+              <a:buSzPct val="100000"/>
+              <a:buFont typeface="Arial" pitchFamily="34" charset="0"/>
+              <a:buNone/>
+              <a:defRPr sz="1400" kern="1200">
+                <a:solidFill>
+                  <a:schemeClr val="tx1"/>
+                </a:solidFill>
+                <a:latin typeface="+mn-lt"/>
+                <a:ea typeface="+mn-ea"/>
+                <a:cs typeface="+mn-cs"/>
+              </a:defRPr>
+            </a:lvl9pPr>
+          </a:lstStyle>
+          <a:p>
+            <a:pPr lvl="1"/>
+            <a:r>
+              <a:rPr lang="pt-PT" dirty="0"/>
+              <a:t>Ao tornar discrete os campos 'age' e 'hoursperweek', conseguimos uma pior visualização dos padrões nos clusters, mas isso resultou de precisão mais elevada. No entanto, notamos que os clusters conseguem separar melhor as classes com base nas horas trabalhadas e na ocupação, como antes visto.</a:t>
+            </a:r>
+          </a:p>
+          <a:p>
+            <a:pPr lvl="1"/>
+            <a:r>
+              <a:rPr lang="pt-PT" dirty="0"/>
+              <a:t>Decidimos continuar usando os dados discretizados, pois isso facilita a compreensão dos padrões nos clusters e faz mais sentido em termos de aplicação prática. No entanto, ao mudar o cluster count para 0, observamos uma diminuição na precisão do algoritmo. Isso pode ser atribuído à necessidade de menos clusters e maior generalização dos dados, o que afetou negativamente o desempenho do algoritmo.</a:t>
+            </a:r>
+          </a:p>
+          <a:p>
+            <a:pPr lvl="1"/>
+            <a:r>
+              <a:rPr lang="pt-PT" dirty="0"/>
+              <a:t>Ao tornar aos cluster_count para 3, acontece um caso específico novamente de que o algoritmo nem tenta advinhar os salário acima de 50k, assume que tudo é menor ou igual a 50k, o que significa que não devemos usar este número de clusters.</a:t>
+            </a:r>
+          </a:p>
+          <a:p>
+            <a:pPr lvl="1"/>
+            <a:r>
+              <a:rPr lang="pt-PT" dirty="0"/>
+              <a:t>Ao aumentar o cluster_count para 20, não observamos uma melhora significativa na precisão. Pelo contrário, os resultados permaneceram semelhantes aos obtidos anteriormente. </a:t>
+            </a:r>
+            <a:r>
+              <a:rPr lang="pt-PT"/>
+              <a:t>Isso nos leva a concluir que não vale a pena utilizar um cluster_count superior a 10 neste caso.</a:t>
+            </a:r>
+            <a:endParaRPr lang="pt-PT" dirty="0"/>
+          </a:p>
+        </p:txBody>
+      </p:sp>
+    </p:spTree>
+    <p:extLst>
+      <p:ext uri="{BB962C8B-B14F-4D97-AF65-F5344CB8AC3E}">
+        <p14:creationId xmlns:p14="http://schemas.microsoft.com/office/powerpoint/2010/main" val="2107356574"/>
       </p:ext>
     </p:extLst>
   </p:cSld>

</xml_diff>

<commit_message>
penso que vou dar como terminado
</commit_message>
<xml_diff>
--- a/Parte_2/DataMining.pptx
+++ b/Parte_2/DataMining.pptx
@@ -5,10 +5,10 @@
     <p:sldMasterId id="2147483648" r:id="rId1"/>
   </p:sldMasterIdLst>
   <p:notesMasterIdLst>
-    <p:notesMasterId r:id="rId33"/>
+    <p:notesMasterId r:id="rId34"/>
   </p:notesMasterIdLst>
   <p:handoutMasterIdLst>
-    <p:handoutMasterId r:id="rId34"/>
+    <p:handoutMasterId r:id="rId35"/>
   </p:handoutMasterIdLst>
   <p:sldIdLst>
     <p:sldId id="271" r:id="rId2"/>
@@ -34,14 +34,15 @@
     <p:sldId id="303" r:id="rId22"/>
     <p:sldId id="304" r:id="rId23"/>
     <p:sldId id="298" r:id="rId24"/>
-    <p:sldId id="289" r:id="rId25"/>
-    <p:sldId id="290" r:id="rId26"/>
-    <p:sldId id="291" r:id="rId27"/>
-    <p:sldId id="305" r:id="rId28"/>
-    <p:sldId id="293" r:id="rId29"/>
-    <p:sldId id="306" r:id="rId30"/>
-    <p:sldId id="299" r:id="rId31"/>
-    <p:sldId id="307" r:id="rId32"/>
+    <p:sldId id="309" r:id="rId25"/>
+    <p:sldId id="308" r:id="rId26"/>
+    <p:sldId id="290" r:id="rId27"/>
+    <p:sldId id="291" r:id="rId28"/>
+    <p:sldId id="305" r:id="rId29"/>
+    <p:sldId id="293" r:id="rId30"/>
+    <p:sldId id="306" r:id="rId31"/>
+    <p:sldId id="299" r:id="rId32"/>
+    <p:sldId id="307" r:id="rId33"/>
   </p:sldIdLst>
   <p:sldSz cx="12192000" cy="6858000"/>
   <p:notesSz cx="6858000" cy="9144000"/>
@@ -165,7 +166,7 @@
 <file path=ppt/revisionInfo.xml><?xml version="1.0" encoding="utf-8"?>
 <p1510:revInfo xmlns:a="http://schemas.openxmlformats.org/drawingml/2006/main" xmlns:r="http://schemas.openxmlformats.org/officeDocument/2006/relationships" xmlns:p1510="http://schemas.microsoft.com/office/powerpoint/2015/10/main">
   <p1510:revLst>
-    <p1510:client id="{965FDAD3-091D-4772-823C-0F2E48122C99}" v="6523" dt="2022-12-27T18:47:04.614"/>
+    <p1510:client id="{E246EFFC-66B8-444F-BAEA-06D0F9021FF1}" v="495" dt="2023-01-06T01:57:07.275"/>
   </p1510:revLst>
 </p1510:revInfo>
 </file>
@@ -1565,6 +1566,209 @@
       </pc:sldChg>
     </pc:docChg>
   </pc:docChgLst>
+  <pc:docChgLst>
+    <pc:chgData name="Paulo Henrique" userId="c679ef514fe8a1b6" providerId="LiveId" clId="{E246EFFC-66B8-444F-BAEA-06D0F9021FF1}"/>
+    <pc:docChg chg="undo custSel addSld delSld modSld">
+      <pc:chgData name="Paulo Henrique" userId="c679ef514fe8a1b6" providerId="LiveId" clId="{E246EFFC-66B8-444F-BAEA-06D0F9021FF1}" dt="2023-01-06T01:57:18.993" v="1250" actId="1076"/>
+      <pc:docMkLst>
+        <pc:docMk/>
+      </pc:docMkLst>
+      <pc:sldChg chg="modSp mod">
+        <pc:chgData name="Paulo Henrique" userId="c679ef514fe8a1b6" providerId="LiveId" clId="{E246EFFC-66B8-444F-BAEA-06D0F9021FF1}" dt="2023-01-05T21:22:58.467" v="0" actId="20577"/>
+        <pc:sldMkLst>
+          <pc:docMk/>
+          <pc:sldMk cId="3082747759" sldId="272"/>
+        </pc:sldMkLst>
+        <pc:spChg chg="mod">
+          <ac:chgData name="Paulo Henrique" userId="c679ef514fe8a1b6" providerId="LiveId" clId="{E246EFFC-66B8-444F-BAEA-06D0F9021FF1}" dt="2023-01-05T21:22:58.467" v="0" actId="20577"/>
+          <ac:spMkLst>
+            <pc:docMk/>
+            <pc:sldMk cId="3082747759" sldId="272"/>
+            <ac:spMk id="3" creationId="{00000000-0000-0000-0000-000000000000}"/>
+          </ac:spMkLst>
+        </pc:spChg>
+      </pc:sldChg>
+      <pc:sldChg chg="delSp mod delAnim">
+        <pc:chgData name="Paulo Henrique" userId="c679ef514fe8a1b6" providerId="LiveId" clId="{E246EFFC-66B8-444F-BAEA-06D0F9021FF1}" dt="2023-01-05T22:32:11.003" v="1" actId="478"/>
+        <pc:sldMkLst>
+          <pc:docMk/>
+          <pc:sldMk cId="2537979847" sldId="282"/>
+        </pc:sldMkLst>
+        <pc:picChg chg="del">
+          <ac:chgData name="Paulo Henrique" userId="c679ef514fe8a1b6" providerId="LiveId" clId="{E246EFFC-66B8-444F-BAEA-06D0F9021FF1}" dt="2023-01-05T22:32:11.003" v="1" actId="478"/>
+          <ac:picMkLst>
+            <pc:docMk/>
+            <pc:sldMk cId="2537979847" sldId="282"/>
+            <ac:picMk id="4" creationId="{15FA6B5D-3CD7-AA51-BD9B-E78E70DAD16B}"/>
+          </ac:picMkLst>
+        </pc:picChg>
+      </pc:sldChg>
+      <pc:sldChg chg="addSp delSp modSp del mod">
+        <pc:chgData name="Paulo Henrique" userId="c679ef514fe8a1b6" providerId="LiveId" clId="{E246EFFC-66B8-444F-BAEA-06D0F9021FF1}" dt="2023-01-06T01:07:35.845" v="239" actId="47"/>
+        <pc:sldMkLst>
+          <pc:docMk/>
+          <pc:sldMk cId="1298620108" sldId="289"/>
+        </pc:sldMkLst>
+        <pc:picChg chg="add del">
+          <ac:chgData name="Paulo Henrique" userId="c679ef514fe8a1b6" providerId="LiveId" clId="{E246EFFC-66B8-444F-BAEA-06D0F9021FF1}" dt="2023-01-06T01:07:14.482" v="234" actId="21"/>
+          <ac:picMkLst>
+            <pc:docMk/>
+            <pc:sldMk cId="1298620108" sldId="289"/>
+            <ac:picMk id="4" creationId="{247E2047-C022-DA7F-8A36-ACC59893EB01}"/>
+          </ac:picMkLst>
+        </pc:picChg>
+        <pc:picChg chg="add del mod">
+          <ac:chgData name="Paulo Henrique" userId="c679ef514fe8a1b6" providerId="LiveId" clId="{E246EFFC-66B8-444F-BAEA-06D0F9021FF1}" dt="2023-01-06T01:07:34.726" v="238" actId="478"/>
+          <ac:picMkLst>
+            <pc:docMk/>
+            <pc:sldMk cId="1298620108" sldId="289"/>
+            <ac:picMk id="6" creationId="{DE6FEF67-2DBD-A9F7-18A4-6EA93A180E9C}"/>
+          </ac:picMkLst>
+        </pc:picChg>
+      </pc:sldChg>
+      <pc:sldChg chg="addSp delSp modSp mod">
+        <pc:chgData name="Paulo Henrique" userId="c679ef514fe8a1b6" providerId="LiveId" clId="{E246EFFC-66B8-444F-BAEA-06D0F9021FF1}" dt="2023-01-05T23:50:56.499" v="37" actId="1076"/>
+        <pc:sldMkLst>
+          <pc:docMk/>
+          <pc:sldMk cId="226583255" sldId="296"/>
+        </pc:sldMkLst>
+        <pc:picChg chg="add mod">
+          <ac:chgData name="Paulo Henrique" userId="c679ef514fe8a1b6" providerId="LiveId" clId="{E246EFFC-66B8-444F-BAEA-06D0F9021FF1}" dt="2023-01-05T23:50:56.499" v="37" actId="1076"/>
+          <ac:picMkLst>
+            <pc:docMk/>
+            <pc:sldMk cId="226583255" sldId="296"/>
+            <ac:picMk id="4" creationId="{F9BD0E34-1ACB-EB17-556B-C8693C3B009E}"/>
+          </ac:picMkLst>
+        </pc:picChg>
+        <pc:picChg chg="del">
+          <ac:chgData name="Paulo Henrique" userId="c679ef514fe8a1b6" providerId="LiveId" clId="{E246EFFC-66B8-444F-BAEA-06D0F9021FF1}" dt="2023-01-05T22:32:12.646" v="2" actId="478"/>
+          <ac:picMkLst>
+            <pc:docMk/>
+            <pc:sldMk cId="226583255" sldId="296"/>
+            <ac:picMk id="5" creationId="{9A798322-6C9F-4947-D90B-49A66513D19E}"/>
+          </ac:picMkLst>
+        </pc:picChg>
+      </pc:sldChg>
+      <pc:sldChg chg="addSp delSp modSp add mod modAnim">
+        <pc:chgData name="Paulo Henrique" userId="c679ef514fe8a1b6" providerId="LiveId" clId="{E246EFFC-66B8-444F-BAEA-06D0F9021FF1}" dt="2023-01-06T01:57:18.993" v="1250" actId="1076"/>
+        <pc:sldMkLst>
+          <pc:docMk/>
+          <pc:sldMk cId="360085179" sldId="308"/>
+        </pc:sldMkLst>
+        <pc:spChg chg="mod">
+          <ac:chgData name="Paulo Henrique" userId="c679ef514fe8a1b6" providerId="LiveId" clId="{E246EFFC-66B8-444F-BAEA-06D0F9021FF1}" dt="2023-01-05T22:34:00.136" v="18" actId="1076"/>
+          <ac:spMkLst>
+            <pc:docMk/>
+            <pc:sldMk cId="360085179" sldId="308"/>
+            <ac:spMk id="2" creationId="{00000000-0000-0000-0000-000000000000}"/>
+          </ac:spMkLst>
+        </pc:spChg>
+        <pc:spChg chg="mod">
+          <ac:chgData name="Paulo Henrique" userId="c679ef514fe8a1b6" providerId="LiveId" clId="{E246EFFC-66B8-444F-BAEA-06D0F9021FF1}" dt="2023-01-06T01:57:07.275" v="1247" actId="20577"/>
+          <ac:spMkLst>
+            <pc:docMk/>
+            <pc:sldMk cId="360085179" sldId="308"/>
+            <ac:spMk id="9" creationId="{7252E61A-240E-8143-B9AD-A29D0456F0BC}"/>
+          </ac:spMkLst>
+        </pc:spChg>
+        <pc:picChg chg="add del mod">
+          <ac:chgData name="Paulo Henrique" userId="c679ef514fe8a1b6" providerId="LiveId" clId="{E246EFFC-66B8-444F-BAEA-06D0F9021FF1}" dt="2023-01-06T01:08:28.177" v="244" actId="478"/>
+          <ac:picMkLst>
+            <pc:docMk/>
+            <pc:sldMk cId="360085179" sldId="308"/>
+            <ac:picMk id="4" creationId="{6D046C9C-D843-CC92-69B9-35E4E3F61D6A}"/>
+          </ac:picMkLst>
+        </pc:picChg>
+        <pc:picChg chg="add del mod">
+          <ac:chgData name="Paulo Henrique" userId="c679ef514fe8a1b6" providerId="LiveId" clId="{E246EFFC-66B8-444F-BAEA-06D0F9021FF1}" dt="2023-01-06T01:31:56.663" v="562" actId="478"/>
+          <ac:picMkLst>
+            <pc:docMk/>
+            <pc:sldMk cId="360085179" sldId="308"/>
+            <ac:picMk id="5" creationId="{FA658D4C-AA89-C378-EA51-48E12D68D12C}"/>
+          </ac:picMkLst>
+        </pc:picChg>
+        <pc:picChg chg="add del mod">
+          <ac:chgData name="Paulo Henrique" userId="c679ef514fe8a1b6" providerId="LiveId" clId="{E246EFFC-66B8-444F-BAEA-06D0F9021FF1}" dt="2023-01-06T01:07:53.205" v="242" actId="478"/>
+          <ac:picMkLst>
+            <pc:docMk/>
+            <pc:sldMk cId="360085179" sldId="308"/>
+            <ac:picMk id="6" creationId="{02DCC1C6-4D61-D1BD-EC31-9DFE39B6672C}"/>
+          </ac:picMkLst>
+        </pc:picChg>
+        <pc:picChg chg="add mod">
+          <ac:chgData name="Paulo Henrique" userId="c679ef514fe8a1b6" providerId="LiveId" clId="{E246EFFC-66B8-444F-BAEA-06D0F9021FF1}" dt="2023-01-06T01:57:18.993" v="1250" actId="1076"/>
+          <ac:picMkLst>
+            <pc:docMk/>
+            <pc:sldMk cId="360085179" sldId="308"/>
+            <ac:picMk id="8" creationId="{7600E097-5AA3-EF58-F011-33AF078B1C20}"/>
+          </ac:picMkLst>
+        </pc:picChg>
+        <pc:picChg chg="add mod">
+          <ac:chgData name="Paulo Henrique" userId="c679ef514fe8a1b6" providerId="LiveId" clId="{E246EFFC-66B8-444F-BAEA-06D0F9021FF1}" dt="2023-01-06T01:57:16.389" v="1249" actId="1076"/>
+          <ac:picMkLst>
+            <pc:docMk/>
+            <pc:sldMk cId="360085179" sldId="308"/>
+            <ac:picMk id="10" creationId="{58076CA7-155D-DD4D-841E-93240A3A9083}"/>
+          </ac:picMkLst>
+        </pc:picChg>
+      </pc:sldChg>
+      <pc:sldChg chg="addSp delSp modSp add mod delAnim modAnim">
+        <pc:chgData name="Paulo Henrique" userId="c679ef514fe8a1b6" providerId="LiveId" clId="{E246EFFC-66B8-444F-BAEA-06D0F9021FF1}" dt="2023-01-06T01:49:21.992" v="1019"/>
+        <pc:sldMkLst>
+          <pc:docMk/>
+          <pc:sldMk cId="274936474" sldId="309"/>
+        </pc:sldMkLst>
+        <pc:spChg chg="mod">
+          <ac:chgData name="Paulo Henrique" userId="c679ef514fe8a1b6" providerId="LiveId" clId="{E246EFFC-66B8-444F-BAEA-06D0F9021FF1}" dt="2023-01-06T01:27:45.078" v="520" actId="20577"/>
+          <ac:spMkLst>
+            <pc:docMk/>
+            <pc:sldMk cId="274936474" sldId="309"/>
+            <ac:spMk id="9" creationId="{7252E61A-240E-8143-B9AD-A29D0456F0BC}"/>
+          </ac:spMkLst>
+        </pc:spChg>
+        <pc:picChg chg="add mod">
+          <ac:chgData name="Paulo Henrique" userId="c679ef514fe8a1b6" providerId="LiveId" clId="{E246EFFC-66B8-444F-BAEA-06D0F9021FF1}" dt="2023-01-06T01:27:48.275" v="521" actId="1076"/>
+          <ac:picMkLst>
+            <pc:docMk/>
+            <pc:sldMk cId="274936474" sldId="309"/>
+            <ac:picMk id="3" creationId="{7C45EA46-4FB0-726B-1154-29BC0B2CD869}"/>
+          </ac:picMkLst>
+        </pc:picChg>
+        <pc:picChg chg="del">
+          <ac:chgData name="Paulo Henrique" userId="c679ef514fe8a1b6" providerId="LiveId" clId="{E246EFFC-66B8-444F-BAEA-06D0F9021FF1}" dt="2023-01-05T22:45:57.437" v="21" actId="478"/>
+          <ac:picMkLst>
+            <pc:docMk/>
+            <pc:sldMk cId="274936474" sldId="309"/>
+            <ac:picMk id="4" creationId="{247E2047-C022-DA7F-8A36-ACC59893EB01}"/>
+          </ac:picMkLst>
+        </pc:picChg>
+        <pc:picChg chg="add del mod">
+          <ac:chgData name="Paulo Henrique" userId="c679ef514fe8a1b6" providerId="LiveId" clId="{E246EFFC-66B8-444F-BAEA-06D0F9021FF1}" dt="2023-01-06T01:48:12.868" v="1006" actId="21"/>
+          <ac:picMkLst>
+            <pc:docMk/>
+            <pc:sldMk cId="274936474" sldId="309"/>
+            <ac:picMk id="5" creationId="{05EC6245-819A-240F-283B-5899897D96F0}"/>
+          </ac:picMkLst>
+        </pc:picChg>
+        <pc:picChg chg="add del mod">
+          <ac:chgData name="Paulo Henrique" userId="c679ef514fe8a1b6" providerId="LiveId" clId="{E246EFFC-66B8-444F-BAEA-06D0F9021FF1}" dt="2023-01-06T01:48:57.234" v="1016" actId="478"/>
+          <ac:picMkLst>
+            <pc:docMk/>
+            <pc:sldMk cId="274936474" sldId="309"/>
+            <ac:picMk id="7" creationId="{DAEF0FD5-DF21-092B-6B5F-E7F19F2EC96B}"/>
+          </ac:picMkLst>
+        </pc:picChg>
+        <pc:picChg chg="add mod">
+          <ac:chgData name="Paulo Henrique" userId="c679ef514fe8a1b6" providerId="LiveId" clId="{E246EFFC-66B8-444F-BAEA-06D0F9021FF1}" dt="2023-01-06T01:49:19.440" v="1018" actId="1076"/>
+          <ac:picMkLst>
+            <pc:docMk/>
+            <pc:sldMk cId="274936474" sldId="309"/>
+            <ac:picMk id="10" creationId="{04B38D6C-9C4C-2495-B7C6-30C1BB2949CD}"/>
+          </ac:picMkLst>
+        </pc:picChg>
+      </pc:sldChg>
+    </pc:docChg>
+  </pc:docChgLst>
 </pc:chgInfo>
 </file>
 
@@ -1650,7 +1854,7 @@
           <a:p>
             <a:fld id="{59041DB8-B66F-4DC8-A96E-33677E0F90FF}" type="datetimeFigureOut">
               <a:rPr lang="en-US" smtClean="0"/>
-              <a:t>12/27/2022</a:t>
+              <a:t>1/5/2023</a:t>
             </a:fld>
             <a:endParaRPr lang="en-US"/>
           </a:p>
@@ -1815,7 +2019,7 @@
           <a:p>
             <a:fld id="{DEB49C4A-65AC-492D-9701-81B46C3AD0E4}" type="datetimeFigureOut">
               <a:rPr lang="en-US" smtClean="0"/>
-              <a:t>12/27/2022</a:t>
+              <a:t>1/5/2023</a:t>
             </a:fld>
             <a:endParaRPr lang="en-US"/>
           </a:p>
@@ -4307,7 +4511,7 @@
           <a:p>
             <a:fld id="{384A29A4-78C8-47AB-BA06-22CB45938951}" type="datetime1">
               <a:rPr lang="en-US" smtClean="0"/>
-              <a:t>12/27/2022</a:t>
+              <a:t>1/5/2023</a:t>
             </a:fld>
             <a:endParaRPr lang="en-US"/>
           </a:p>
@@ -4502,7 +4706,7 @@
           <a:p>
             <a:fld id="{E1ED4ACF-2D82-46F2-A8E9-23963AA34E86}" type="datetime1">
               <a:rPr lang="en-US" smtClean="0"/>
-              <a:t>12/27/2022</a:t>
+              <a:t>1/5/2023</a:t>
             </a:fld>
             <a:endParaRPr lang="en-US"/>
           </a:p>
@@ -4686,7 +4890,7 @@
           <a:p>
             <a:fld id="{AE374B5B-21A0-4192-BF4C-38187F1A68D8}" type="datetime1">
               <a:rPr lang="en-US" smtClean="0"/>
-              <a:t>12/27/2022</a:t>
+              <a:t>1/5/2023</a:t>
             </a:fld>
             <a:endParaRPr lang="en-US"/>
           </a:p>
@@ -7027,7 +7231,7 @@
           <a:p>
             <a:fld id="{33B5CF7C-B333-48E1-A4A6-83A3C8B73AC0}" type="datetime1">
               <a:rPr lang="en-US" smtClean="0"/>
-              <a:t>12/27/2022</a:t>
+              <a:t>1/5/2023</a:t>
             </a:fld>
             <a:endParaRPr lang="en-US"/>
           </a:p>
@@ -7480,7 +7684,7 @@
           <a:p>
             <a:fld id="{AE320762-5CBF-4210-AB54-376B091119F8}" type="datetime1">
               <a:rPr lang="en-US" smtClean="0"/>
-              <a:t>12/27/2022</a:t>
+              <a:t>1/5/2023</a:t>
             </a:fld>
             <a:endParaRPr lang="en-US"/>
           </a:p>
@@ -7612,7 +7816,7 @@
           <a:p>
             <a:fld id="{7F0DB371-BF5F-4058-A212-1A908E4D2674}" type="datetime1">
               <a:rPr lang="en-US" smtClean="0"/>
-              <a:t>12/27/2022</a:t>
+              <a:t>1/5/2023</a:t>
             </a:fld>
             <a:endParaRPr lang="en-US"/>
           </a:p>
@@ -9545,7 +9749,7 @@
           <a:p>
             <a:fld id="{60A4083B-90AA-48CF-BAD5-00AA24D7F288}" type="datetime1">
               <a:rPr lang="en-US" smtClean="0"/>
-              <a:t>12/27/2022</a:t>
+              <a:t>1/5/2023</a:t>
             </a:fld>
             <a:endParaRPr lang="en-US"/>
           </a:p>
@@ -11804,7 +12008,7 @@
             <a:fld id="{F5BAF629-ECA2-4CF3-B790-9D9BDED98269}" type="datetime1">
               <a:rPr lang="en-US" smtClean="0"/>
               <a:pPr/>
-              <a:t>12/27/2022</a:t>
+              <a:t>1/5/2023</a:t>
             </a:fld>
             <a:endParaRPr lang="en-US"/>
           </a:p>
@@ -16099,7 +16303,7 @@
             <a:fld id="{B51B2453-8663-4C69-AF73-9FD7B1DEC5D0}" type="datetime1">
               <a:rPr lang="en-US" smtClean="0"/>
               <a:pPr/>
-              <a:t>12/27/2022</a:t>
+              <a:t>1/5/2023</a:t>
             </a:fld>
             <a:endParaRPr lang="en-US" dirty="0"/>
           </a:p>
@@ -18055,36 +18259,6 @@
           </a:p>
         </p:txBody>
       </p:sp>
-      <p:pic>
-        <p:nvPicPr>
-          <p:cNvPr id="4" name="Picture 3">
-            <a:extLst>
-              <a:ext uri="{FF2B5EF4-FFF2-40B4-BE49-F238E27FC236}">
-                <a16:creationId xmlns:a16="http://schemas.microsoft.com/office/drawing/2014/main" id="{15FA6B5D-3CD7-AA51-BD9B-E78E70DAD16B}"/>
-              </a:ext>
-            </a:extLst>
-          </p:cNvPr>
-          <p:cNvPicPr>
-            <a:picLocks noChangeAspect="1"/>
-          </p:cNvPicPr>
-          <p:nvPr/>
-        </p:nvPicPr>
-        <p:blipFill>
-          <a:blip r:embed="rId2"/>
-          <a:stretch>
-            <a:fillRect/>
-          </a:stretch>
-        </p:blipFill>
-        <p:spPr>
-          <a:xfrm>
-            <a:off x="3184800" y="3429000"/>
-            <a:ext cx="5574921" cy="3388125"/>
-          </a:xfrm>
-          <a:prstGeom prst="rect">
-            <a:avLst/>
-          </a:prstGeom>
-        </p:spPr>
-      </p:pic>
     </p:spTree>
     <p:extLst>
       <p:ext uri="{BB962C8B-B14F-4D97-AF65-F5344CB8AC3E}">
@@ -18107,126 +18281,6 @@
       </p:transition>
     </mc:Fallback>
   </mc:AlternateContent>
-  <p:timing>
-    <p:tnLst>
-      <p:par>
-        <p:cTn id="1" dur="indefinite" restart="never" nodeType="tmRoot">
-          <p:childTnLst>
-            <p:seq concurrent="1" nextAc="seek">
-              <p:cTn id="2" dur="indefinite" nodeType="mainSeq">
-                <p:childTnLst>
-                  <p:par>
-                    <p:cTn id="3" fill="hold">
-                      <p:stCondLst>
-                        <p:cond delay="indefinite"/>
-                      </p:stCondLst>
-                      <p:childTnLst>
-                        <p:par>
-                          <p:cTn id="4" fill="hold">
-                            <p:stCondLst>
-                              <p:cond delay="0"/>
-                            </p:stCondLst>
-                            <p:childTnLst>
-                              <p:par>
-                                <p:cTn id="5" presetID="1" presetClass="entr" presetSubtype="0" fill="hold" nodeType="clickEffect">
-                                  <p:stCondLst>
-                                    <p:cond delay="0"/>
-                                  </p:stCondLst>
-                                  <p:childTnLst>
-                                    <p:set>
-                                      <p:cBhvr>
-                                        <p:cTn id="6" dur="1" fill="hold">
-                                          <p:stCondLst>
-                                            <p:cond delay="0"/>
-                                          </p:stCondLst>
-                                        </p:cTn>
-                                        <p:tgtEl>
-                                          <p:spTgt spid="4"/>
-                                        </p:tgtEl>
-                                        <p:attrNameLst>
-                                          <p:attrName>style.visibility</p:attrName>
-                                        </p:attrNameLst>
-                                      </p:cBhvr>
-                                      <p:to>
-                                        <p:strVal val="visible"/>
-                                      </p:to>
-                                    </p:set>
-                                  </p:childTnLst>
-                                </p:cTn>
-                              </p:par>
-                            </p:childTnLst>
-                          </p:cTn>
-                        </p:par>
-                      </p:childTnLst>
-                    </p:cTn>
-                  </p:par>
-                  <p:par>
-                    <p:cTn id="7" fill="hold">
-                      <p:stCondLst>
-                        <p:cond delay="indefinite"/>
-                      </p:stCondLst>
-                      <p:childTnLst>
-                        <p:par>
-                          <p:cTn id="8" fill="hold">
-                            <p:stCondLst>
-                              <p:cond delay="0"/>
-                            </p:stCondLst>
-                            <p:childTnLst>
-                              <p:par>
-                                <p:cTn id="9" presetID="1" presetClass="exit" presetSubtype="0" fill="hold" nodeType="clickEffect">
-                                  <p:stCondLst>
-                                    <p:cond delay="0"/>
-                                  </p:stCondLst>
-                                  <p:childTnLst>
-                                    <p:set>
-                                      <p:cBhvr>
-                                        <p:cTn id="10" dur="1" fill="hold">
-                                          <p:stCondLst>
-                                            <p:cond delay="0"/>
-                                          </p:stCondLst>
-                                        </p:cTn>
-                                        <p:tgtEl>
-                                          <p:spTgt spid="4"/>
-                                        </p:tgtEl>
-                                        <p:attrNameLst>
-                                          <p:attrName>style.visibility</p:attrName>
-                                        </p:attrNameLst>
-                                      </p:cBhvr>
-                                      <p:to>
-                                        <p:strVal val="hidden"/>
-                                      </p:to>
-                                    </p:set>
-                                  </p:childTnLst>
-                                </p:cTn>
-                              </p:par>
-                            </p:childTnLst>
-                          </p:cTn>
-                        </p:par>
-                      </p:childTnLst>
-                    </p:cTn>
-                  </p:par>
-                </p:childTnLst>
-              </p:cTn>
-              <p:prevCondLst>
-                <p:cond evt="onPrev" delay="0">
-                  <p:tgtEl>
-                    <p:sldTgt/>
-                  </p:tgtEl>
-                </p:cond>
-              </p:prevCondLst>
-              <p:nextCondLst>
-                <p:cond evt="onNext" delay="0">
-                  <p:tgtEl>
-                    <p:sldTgt/>
-                  </p:tgtEl>
-                </p:cond>
-              </p:nextCondLst>
-            </p:seq>
-          </p:childTnLst>
-        </p:cTn>
-      </p:par>
-    </p:tnLst>
-  </p:timing>
 </p:sld>
 </file>
 
@@ -18537,10 +18591,10 @@
       </p:sp>
       <p:pic>
         <p:nvPicPr>
-          <p:cNvPr id="5" name="Picture 4">
+          <p:cNvPr id="4" name="Picture 3">
             <a:extLst>
               <a:ext uri="{FF2B5EF4-FFF2-40B4-BE49-F238E27FC236}">
-                <a16:creationId xmlns:a16="http://schemas.microsoft.com/office/drawing/2014/main" id="{9A798322-6C9F-4947-D90B-49A66513D19E}"/>
+                <a16:creationId xmlns:a16="http://schemas.microsoft.com/office/drawing/2014/main" id="{F9BD0E34-1ACB-EB17-556B-C8693C3B009E}"/>
               </a:ext>
             </a:extLst>
           </p:cNvPr>
@@ -18557,8 +18611,8 @@
         </p:blipFill>
         <p:spPr>
           <a:xfrm>
-            <a:off x="3575107" y="2350839"/>
-            <a:ext cx="5029200" cy="3371850"/>
+            <a:off x="3591796" y="1971104"/>
+            <a:ext cx="4995821" cy="4081553"/>
           </a:xfrm>
           <a:prstGeom prst="rect">
             <a:avLst/>
@@ -21102,14 +21156,7 @@
           <a:bodyPr/>
           <a:lstStyle/>
           <a:p>
-            <a:r>
-              <a:rPr lang="en-US" dirty="0" err="1"/>
-              <a:t>Parâmetros</a:t>
-            </a:r>
-            <a:r>
-              <a:rPr lang="en-US" dirty="0"/>
-              <a:t> Default</a:t>
-            </a:r>
+            <a:endParaRPr lang="en-US" dirty="0"/>
           </a:p>
         </p:txBody>
       </p:sp>
@@ -23036,14 +23083,89 @@
             </a:lvl9pPr>
           </a:lstStyle>
           <a:p>
-            <a:endParaRPr lang="pt-PT" dirty="0"/>
+            <a:r>
+              <a:rPr lang="pt-PT" dirty="0"/>
+              <a:t>As regras de associação são um tipo de método de aprendizado de máquina baseado em regras utilizado para identificar relações entre variáveis em um grande conjunto de dados. Eles são comumente utilizados na área de mineração de dados e são usados ​​para descobrir padrões de associação entre itens em um grande conjunto de dados.</a:t>
+            </a:r>
+          </a:p>
+          <a:p>
+            <a:r>
+              <a:rPr lang="pt-PT" dirty="0"/>
+              <a:t>Os padrões aqui encontrados não se diferenciam muito do que antes já tinha sido observado, em que o capital e estado de casado tem bastante peso no salário.</a:t>
+            </a:r>
+          </a:p>
+          <a:p>
+            <a:r>
+              <a:rPr lang="pt-PT" dirty="0"/>
+              <a:t>Observando os items sets é onde realmente podemos a quantidade de dados que combinações contêm.</a:t>
+            </a:r>
           </a:p>
         </p:txBody>
       </p:sp>
+      <p:pic>
+        <p:nvPicPr>
+          <p:cNvPr id="3" name="Picture 2">
+            <a:extLst>
+              <a:ext uri="{FF2B5EF4-FFF2-40B4-BE49-F238E27FC236}">
+                <a16:creationId xmlns:a16="http://schemas.microsoft.com/office/drawing/2014/main" id="{7C45EA46-4FB0-726B-1154-29BC0B2CD869}"/>
+              </a:ext>
+            </a:extLst>
+          </p:cNvPr>
+          <p:cNvPicPr>
+            <a:picLocks noChangeAspect="1"/>
+          </p:cNvPicPr>
+          <p:nvPr/>
+        </p:nvPicPr>
+        <p:blipFill>
+          <a:blip r:embed="rId2"/>
+          <a:stretch>
+            <a:fillRect/>
+          </a:stretch>
+        </p:blipFill>
+        <p:spPr>
+          <a:xfrm>
+            <a:off x="1946332" y="1936371"/>
+            <a:ext cx="8286750" cy="4162425"/>
+          </a:xfrm>
+          <a:prstGeom prst="rect">
+            <a:avLst/>
+          </a:prstGeom>
+        </p:spPr>
+      </p:pic>
+      <p:pic>
+        <p:nvPicPr>
+          <p:cNvPr id="10" name="Picture 9">
+            <a:extLst>
+              <a:ext uri="{FF2B5EF4-FFF2-40B4-BE49-F238E27FC236}">
+                <a16:creationId xmlns:a16="http://schemas.microsoft.com/office/drawing/2014/main" id="{04B38D6C-9C4C-2495-B7C6-30C1BB2949CD}"/>
+              </a:ext>
+            </a:extLst>
+          </p:cNvPr>
+          <p:cNvPicPr>
+            <a:picLocks noChangeAspect="1"/>
+          </p:cNvPicPr>
+          <p:nvPr/>
+        </p:nvPicPr>
+        <p:blipFill>
+          <a:blip r:embed="rId3"/>
+          <a:stretch>
+            <a:fillRect/>
+          </a:stretch>
+        </p:blipFill>
+        <p:spPr>
+          <a:xfrm>
+            <a:off x="3060757" y="2088771"/>
+            <a:ext cx="6057900" cy="4010025"/>
+          </a:xfrm>
+          <a:prstGeom prst="rect">
+            <a:avLst/>
+          </a:prstGeom>
+        </p:spPr>
+      </p:pic>
     </p:spTree>
     <p:extLst>
       <p:ext uri="{BB962C8B-B14F-4D97-AF65-F5344CB8AC3E}">
-        <p14:creationId xmlns:p14="http://schemas.microsoft.com/office/powerpoint/2010/main" val="1298620108"/>
+        <p14:creationId xmlns:p14="http://schemas.microsoft.com/office/powerpoint/2010/main" val="274936474"/>
       </p:ext>
     </p:extLst>
   </p:cSld>
@@ -23062,6 +23184,171 @@
       </p:transition>
     </mc:Fallback>
   </mc:AlternateContent>
+  <p:timing>
+    <p:tnLst>
+      <p:par>
+        <p:cTn id="1" dur="indefinite" restart="never" nodeType="tmRoot">
+          <p:childTnLst>
+            <p:seq concurrent="1" nextAc="seek">
+              <p:cTn id="2" dur="indefinite" nodeType="mainSeq">
+                <p:childTnLst>
+                  <p:par>
+                    <p:cTn id="3" fill="hold">
+                      <p:stCondLst>
+                        <p:cond delay="indefinite"/>
+                      </p:stCondLst>
+                      <p:childTnLst>
+                        <p:par>
+                          <p:cTn id="4" fill="hold">
+                            <p:stCondLst>
+                              <p:cond delay="0"/>
+                            </p:stCondLst>
+                            <p:childTnLst>
+                              <p:par>
+                                <p:cTn id="5" presetID="1" presetClass="entr" presetSubtype="0" fill="hold" nodeType="clickEffect">
+                                  <p:stCondLst>
+                                    <p:cond delay="0"/>
+                                  </p:stCondLst>
+                                  <p:childTnLst>
+                                    <p:set>
+                                      <p:cBhvr>
+                                        <p:cTn id="6" dur="1" fill="hold">
+                                          <p:stCondLst>
+                                            <p:cond delay="0"/>
+                                          </p:stCondLst>
+                                        </p:cTn>
+                                        <p:tgtEl>
+                                          <p:spTgt spid="3"/>
+                                        </p:tgtEl>
+                                        <p:attrNameLst>
+                                          <p:attrName>style.visibility</p:attrName>
+                                        </p:attrNameLst>
+                                      </p:cBhvr>
+                                      <p:to>
+                                        <p:strVal val="visible"/>
+                                      </p:to>
+                                    </p:set>
+                                  </p:childTnLst>
+                                </p:cTn>
+                              </p:par>
+                            </p:childTnLst>
+                          </p:cTn>
+                        </p:par>
+                      </p:childTnLst>
+                    </p:cTn>
+                  </p:par>
+                  <p:par>
+                    <p:cTn id="7" fill="hold">
+                      <p:stCondLst>
+                        <p:cond delay="indefinite"/>
+                      </p:stCondLst>
+                      <p:childTnLst>
+                        <p:par>
+                          <p:cTn id="8" fill="hold">
+                            <p:stCondLst>
+                              <p:cond delay="0"/>
+                            </p:stCondLst>
+                            <p:childTnLst>
+                              <p:par>
+                                <p:cTn id="9" presetID="1" presetClass="exit" presetSubtype="0" fill="hold" nodeType="clickEffect">
+                                  <p:stCondLst>
+                                    <p:cond delay="0"/>
+                                  </p:stCondLst>
+                                  <p:childTnLst>
+                                    <p:set>
+                                      <p:cBhvr>
+                                        <p:cTn id="10" dur="1" fill="hold">
+                                          <p:stCondLst>
+                                            <p:cond delay="0"/>
+                                          </p:stCondLst>
+                                        </p:cTn>
+                                        <p:tgtEl>
+                                          <p:spTgt spid="3"/>
+                                        </p:tgtEl>
+                                        <p:attrNameLst>
+                                          <p:attrName>style.visibility</p:attrName>
+                                        </p:attrNameLst>
+                                      </p:cBhvr>
+                                      <p:to>
+                                        <p:strVal val="hidden"/>
+                                      </p:to>
+                                    </p:set>
+                                  </p:childTnLst>
+                                </p:cTn>
+                              </p:par>
+                            </p:childTnLst>
+                          </p:cTn>
+                        </p:par>
+                      </p:childTnLst>
+                    </p:cTn>
+                  </p:par>
+                  <p:par>
+                    <p:cTn id="11" fill="hold">
+                      <p:stCondLst>
+                        <p:cond delay="indefinite"/>
+                      </p:stCondLst>
+                      <p:childTnLst>
+                        <p:par>
+                          <p:cTn id="12" fill="hold">
+                            <p:stCondLst>
+                              <p:cond delay="0"/>
+                            </p:stCondLst>
+                            <p:childTnLst>
+                              <p:par>
+                                <p:cTn id="13" presetID="1" presetClass="entr" presetSubtype="0" fill="hold" nodeType="clickEffect">
+                                  <p:stCondLst>
+                                    <p:cond delay="0"/>
+                                  </p:stCondLst>
+                                  <p:childTnLst>
+                                    <p:set>
+                                      <p:cBhvr>
+                                        <p:cTn id="14" dur="1" fill="hold">
+                                          <p:stCondLst>
+                                            <p:cond delay="0"/>
+                                          </p:stCondLst>
+                                        </p:cTn>
+                                        <p:tgtEl>
+                                          <p:spTgt spid="10"/>
+                                        </p:tgtEl>
+                                        <p:attrNameLst>
+                                          <p:attrName>style.visibility</p:attrName>
+                                        </p:attrNameLst>
+                                      </p:cBhvr>
+                                      <p:to>
+                                        <p:strVal val="visible"/>
+                                      </p:to>
+                                    </p:set>
+                                  </p:childTnLst>
+                                </p:cTn>
+                              </p:par>
+                            </p:childTnLst>
+                          </p:cTn>
+                        </p:par>
+                      </p:childTnLst>
+                    </p:cTn>
+                  </p:par>
+                </p:childTnLst>
+              </p:cTn>
+              <p:prevCondLst>
+                <p:cond evt="onPrev" delay="0">
+                  <p:tgtEl>
+                    <p:sldTgt/>
+                  </p:tgtEl>
+                </p:cond>
+              </p:prevCondLst>
+              <p:nextCondLst>
+                <p:cond evt="onNext" delay="0">
+                  <p:tgtEl>
+                    <p:sldTgt/>
+                  </p:tgtEl>
+                </p:cond>
+              </p:nextCondLst>
+            </p:seq>
+          </p:childTnLst>
+        </p:cTn>
+      </p:par>
+    </p:tnLst>
+  </p:timing>
 </p:sld>
 </file>
 
@@ -23094,17 +23381,31 @@
         </p:nvSpPr>
         <p:spPr>
           <a:xfrm>
-            <a:off x="1289107" y="251670"/>
-            <a:ext cx="9601200" cy="622184"/>
+            <a:off x="925409" y="232620"/>
+            <a:ext cx="10331393" cy="622184"/>
           </a:xfrm>
         </p:spPr>
         <p:txBody>
-          <a:bodyPr/>
+          <a:bodyPr>
+            <a:normAutofit fontScale="90000"/>
+          </a:bodyPr>
           <a:lstStyle/>
           <a:p>
             <a:r>
+              <a:rPr lang="en-US" dirty="0" err="1"/>
+              <a:t>Análise</a:t>
+            </a:r>
+            <a:r>
               <a:rPr lang="en-US" dirty="0"/>
-              <a:t>K-Means – </a:t>
+              <a:t> de </a:t>
+            </a:r>
+            <a:r>
+              <a:rPr lang="en-US" dirty="0" err="1"/>
+              <a:t>Associação</a:t>
+            </a:r>
+            <a:r>
+              <a:rPr lang="en-US" dirty="0"/>
+              <a:t> Sem Capital – </a:t>
             </a:r>
             <a:r>
               <a:rPr lang="en-US" dirty="0" err="1"/>
@@ -23365,28 +23666,19 @@
           <a:p>
             <a:r>
               <a:rPr lang="pt-PT" dirty="0"/>
-              <a:t>O método de mineração de cluster é um tipo de técnica de aprendizado de máquina que é usada para agrupar exemplos em conjuntos de dados em grupos (ou clusters) de maneira que os exemplos em um mesmo cluster sejam similares entre si e diferentes dos exemplos em outros clusters. O objetivo do método de mineração de cluster é descobrir padrões ocultos nos dados e agrupar os exemplos de acordo com esses padrões.</a:t>
-            </a:r>
-            <a:endParaRPr lang="en-US" dirty="0"/>
+              <a:t>Neste caso, removemos o capital como variável de entrada para observar o desempenho das regras de associação. Como esperávamos, a precisão foi afetada, pois muitos dos casos foram separados com base no capital, como havíamos observado anteriormente.</a:t>
+            </a:r>
           </a:p>
           <a:p>
             <a:r>
               <a:rPr lang="pt-PT" dirty="0"/>
-              <a:t>O método de clusterização facilita a visualização de padrões presentes no conjunto de dados, como os casos específicos encontrados no conjunto de dados:</a:t>
+              <a:t>Aqui fica mais promiante em que a educação também é algo que influencia a separação, onde antes se encontrava com menos importância.</a:t>
             </a:r>
           </a:p>
           <a:p>
-            <a:pPr lvl="1"/>
             <a:r>
               <a:rPr lang="pt-PT" dirty="0"/>
-              <a:t>No cluster 10 todos os casos eram acima de 50k, praticamente tudo homem, eram casados, maior parte trabalhava 30 a 40 horas por semana, o seu capitalloss era abaixo de 672, e o capitalgain era 10937 a 17187 e 17817 a 23437, todos eles nunca abaixo de 29 anos.</a:t>
-            </a:r>
-          </a:p>
-          <a:p>
-            <a:pPr lvl="1"/>
-            <a:r>
-              <a:rPr lang="pt-PT" dirty="0"/>
-              <a:t>No cluster 9 verifica-se essencialmente o mesmo, o que muda é o capitalgain para 4687 a 10937.</a:t>
+              <a:t>No items sest tem casos interessantes que saltam à visto, especialmente que mutos dos civ-spouse male têm o salário abaixo de 50k, mas nas regras diz que civ-spouse têm bastante peso no acima de 50k.</a:t>
             </a:r>
           </a:p>
           <a:p>
@@ -23394,10 +23686,70 @@
           </a:p>
         </p:txBody>
       </p:sp>
+      <p:pic>
+        <p:nvPicPr>
+          <p:cNvPr id="8" name="Picture 7">
+            <a:extLst>
+              <a:ext uri="{FF2B5EF4-FFF2-40B4-BE49-F238E27FC236}">
+                <a16:creationId xmlns:a16="http://schemas.microsoft.com/office/drawing/2014/main" id="{7600E097-5AA3-EF58-F011-33AF078B1C20}"/>
+              </a:ext>
+            </a:extLst>
+          </p:cNvPr>
+          <p:cNvPicPr>
+            <a:picLocks noChangeAspect="1"/>
+          </p:cNvPicPr>
+          <p:nvPr/>
+        </p:nvPicPr>
+        <p:blipFill>
+          <a:blip r:embed="rId2"/>
+          <a:stretch>
+            <a:fillRect/>
+          </a:stretch>
+        </p:blipFill>
+        <p:spPr>
+          <a:xfrm>
+            <a:off x="2681155" y="1147543"/>
+            <a:ext cx="6819900" cy="4200525"/>
+          </a:xfrm>
+          <a:prstGeom prst="rect">
+            <a:avLst/>
+          </a:prstGeom>
+        </p:spPr>
+      </p:pic>
+      <p:pic>
+        <p:nvPicPr>
+          <p:cNvPr id="10" name="Picture 9">
+            <a:extLst>
+              <a:ext uri="{FF2B5EF4-FFF2-40B4-BE49-F238E27FC236}">
+                <a16:creationId xmlns:a16="http://schemas.microsoft.com/office/drawing/2014/main" id="{58076CA7-155D-DD4D-841E-93240A3A9083}"/>
+              </a:ext>
+            </a:extLst>
+          </p:cNvPr>
+          <p:cNvPicPr>
+            <a:picLocks noChangeAspect="1"/>
+          </p:cNvPicPr>
+          <p:nvPr/>
+        </p:nvPicPr>
+        <p:blipFill>
+          <a:blip r:embed="rId3"/>
+          <a:stretch>
+            <a:fillRect/>
+          </a:stretch>
+        </p:blipFill>
+        <p:spPr>
+          <a:xfrm>
+            <a:off x="2624005" y="1509932"/>
+            <a:ext cx="6934200" cy="3990975"/>
+          </a:xfrm>
+          <a:prstGeom prst="rect">
+            <a:avLst/>
+          </a:prstGeom>
+        </p:spPr>
+      </p:pic>
     </p:spTree>
     <p:extLst>
       <p:ext uri="{BB962C8B-B14F-4D97-AF65-F5344CB8AC3E}">
-        <p14:creationId xmlns:p14="http://schemas.microsoft.com/office/powerpoint/2010/main" val="3552763502"/>
+        <p14:creationId xmlns:p14="http://schemas.microsoft.com/office/powerpoint/2010/main" val="360085179"/>
       </p:ext>
     </p:extLst>
   </p:cSld>
@@ -23416,6 +23768,171 @@
       </p:transition>
     </mc:Fallback>
   </mc:AlternateContent>
+  <p:timing>
+    <p:tnLst>
+      <p:par>
+        <p:cTn id="1" dur="indefinite" restart="never" nodeType="tmRoot">
+          <p:childTnLst>
+            <p:seq concurrent="1" nextAc="seek">
+              <p:cTn id="2" dur="indefinite" nodeType="mainSeq">
+                <p:childTnLst>
+                  <p:par>
+                    <p:cTn id="3" fill="hold">
+                      <p:stCondLst>
+                        <p:cond delay="indefinite"/>
+                      </p:stCondLst>
+                      <p:childTnLst>
+                        <p:par>
+                          <p:cTn id="4" fill="hold">
+                            <p:stCondLst>
+                              <p:cond delay="0"/>
+                            </p:stCondLst>
+                            <p:childTnLst>
+                              <p:par>
+                                <p:cTn id="5" presetID="1" presetClass="entr" presetSubtype="0" fill="hold" nodeType="clickEffect">
+                                  <p:stCondLst>
+                                    <p:cond delay="0"/>
+                                  </p:stCondLst>
+                                  <p:childTnLst>
+                                    <p:set>
+                                      <p:cBhvr>
+                                        <p:cTn id="6" dur="1" fill="hold">
+                                          <p:stCondLst>
+                                            <p:cond delay="0"/>
+                                          </p:stCondLst>
+                                        </p:cTn>
+                                        <p:tgtEl>
+                                          <p:spTgt spid="8"/>
+                                        </p:tgtEl>
+                                        <p:attrNameLst>
+                                          <p:attrName>style.visibility</p:attrName>
+                                        </p:attrNameLst>
+                                      </p:cBhvr>
+                                      <p:to>
+                                        <p:strVal val="visible"/>
+                                      </p:to>
+                                    </p:set>
+                                  </p:childTnLst>
+                                </p:cTn>
+                              </p:par>
+                            </p:childTnLst>
+                          </p:cTn>
+                        </p:par>
+                      </p:childTnLst>
+                    </p:cTn>
+                  </p:par>
+                  <p:par>
+                    <p:cTn id="7" fill="hold">
+                      <p:stCondLst>
+                        <p:cond delay="indefinite"/>
+                      </p:stCondLst>
+                      <p:childTnLst>
+                        <p:par>
+                          <p:cTn id="8" fill="hold">
+                            <p:stCondLst>
+                              <p:cond delay="0"/>
+                            </p:stCondLst>
+                            <p:childTnLst>
+                              <p:par>
+                                <p:cTn id="9" presetID="1" presetClass="exit" presetSubtype="0" fill="hold" nodeType="clickEffect">
+                                  <p:stCondLst>
+                                    <p:cond delay="0"/>
+                                  </p:stCondLst>
+                                  <p:childTnLst>
+                                    <p:set>
+                                      <p:cBhvr>
+                                        <p:cTn id="10" dur="1" fill="hold">
+                                          <p:stCondLst>
+                                            <p:cond delay="0"/>
+                                          </p:stCondLst>
+                                        </p:cTn>
+                                        <p:tgtEl>
+                                          <p:spTgt spid="8"/>
+                                        </p:tgtEl>
+                                        <p:attrNameLst>
+                                          <p:attrName>style.visibility</p:attrName>
+                                        </p:attrNameLst>
+                                      </p:cBhvr>
+                                      <p:to>
+                                        <p:strVal val="hidden"/>
+                                      </p:to>
+                                    </p:set>
+                                  </p:childTnLst>
+                                </p:cTn>
+                              </p:par>
+                            </p:childTnLst>
+                          </p:cTn>
+                        </p:par>
+                      </p:childTnLst>
+                    </p:cTn>
+                  </p:par>
+                  <p:par>
+                    <p:cTn id="11" fill="hold">
+                      <p:stCondLst>
+                        <p:cond delay="indefinite"/>
+                      </p:stCondLst>
+                      <p:childTnLst>
+                        <p:par>
+                          <p:cTn id="12" fill="hold">
+                            <p:stCondLst>
+                              <p:cond delay="0"/>
+                            </p:stCondLst>
+                            <p:childTnLst>
+                              <p:par>
+                                <p:cTn id="13" presetID="1" presetClass="entr" presetSubtype="0" fill="hold" nodeType="clickEffect">
+                                  <p:stCondLst>
+                                    <p:cond delay="0"/>
+                                  </p:stCondLst>
+                                  <p:childTnLst>
+                                    <p:set>
+                                      <p:cBhvr>
+                                        <p:cTn id="14" dur="1" fill="hold">
+                                          <p:stCondLst>
+                                            <p:cond delay="0"/>
+                                          </p:stCondLst>
+                                        </p:cTn>
+                                        <p:tgtEl>
+                                          <p:spTgt spid="10"/>
+                                        </p:tgtEl>
+                                        <p:attrNameLst>
+                                          <p:attrName>style.visibility</p:attrName>
+                                        </p:attrNameLst>
+                                      </p:cBhvr>
+                                      <p:to>
+                                        <p:strVal val="visible"/>
+                                      </p:to>
+                                    </p:set>
+                                  </p:childTnLst>
+                                </p:cTn>
+                              </p:par>
+                            </p:childTnLst>
+                          </p:cTn>
+                        </p:par>
+                      </p:childTnLst>
+                    </p:cTn>
+                  </p:par>
+                </p:childTnLst>
+              </p:cTn>
+              <p:prevCondLst>
+                <p:cond evt="onPrev" delay="0">
+                  <p:tgtEl>
+                    <p:sldTgt/>
+                  </p:tgtEl>
+                </p:cond>
+              </p:prevCondLst>
+              <p:nextCondLst>
+                <p:cond evt="onNext" delay="0">
+                  <p:tgtEl>
+                    <p:sldTgt/>
+                  </p:tgtEl>
+                </p:cond>
+              </p:nextCondLst>
+            </p:seq>
+          </p:childTnLst>
+        </p:cTn>
+      </p:par>
+    </p:tnLst>
+  </p:timing>
 </p:sld>
 </file>
 
@@ -23717,6 +24234,360 @@
             </a:lvl9pPr>
           </a:lstStyle>
           <a:p>
+            <a:r>
+              <a:rPr lang="pt-PT" dirty="0"/>
+              <a:t>O método de mineração de cluster é um tipo de técnica de aprendizado de máquina que é usada para agrupar exemplos em conjuntos de dados em grupos (ou clusters) de maneira que os exemplos em um mesmo cluster sejam similares entre si e diferentes dos exemplos em outros clusters. O objetivo do método de mineração de cluster é descobrir padrões ocultos nos dados e agrupar os exemplos de acordo com esses padrões.</a:t>
+            </a:r>
+            <a:endParaRPr lang="en-US" dirty="0"/>
+          </a:p>
+          <a:p>
+            <a:r>
+              <a:rPr lang="pt-PT" dirty="0"/>
+              <a:t>O método de clusterização facilita a visualização de padrões presentes no conjunto de dados, como os casos específicos encontrados no conjunto de dados:</a:t>
+            </a:r>
+          </a:p>
+          <a:p>
+            <a:pPr lvl="1"/>
+            <a:r>
+              <a:rPr lang="pt-PT" dirty="0"/>
+              <a:t>No cluster 10 todos os casos eram acima de 50k, praticamente tudo homem, eram casados, maior parte trabalhava 30 a 40 horas por semana, o seu capitalloss era abaixo de 672, e o capitalgain era 10937 a 17187 e 17817 a 23437, todos eles nunca abaixo de 29 anos.</a:t>
+            </a:r>
+          </a:p>
+          <a:p>
+            <a:pPr lvl="1"/>
+            <a:r>
+              <a:rPr lang="pt-PT" dirty="0"/>
+              <a:t>No cluster 9 verifica-se essencialmente o mesmo, o que muda é o capitalgain para 4687 a 10937.</a:t>
+            </a:r>
+          </a:p>
+          <a:p>
+            <a:endParaRPr lang="pt-PT" dirty="0"/>
+          </a:p>
+        </p:txBody>
+      </p:sp>
+    </p:spTree>
+    <p:extLst>
+      <p:ext uri="{BB962C8B-B14F-4D97-AF65-F5344CB8AC3E}">
+        <p14:creationId xmlns:p14="http://schemas.microsoft.com/office/powerpoint/2010/main" val="3552763502"/>
+      </p:ext>
+    </p:extLst>
+  </p:cSld>
+  <p:clrMapOvr>
+    <a:masterClrMapping/>
+  </p:clrMapOvr>
+  <mc:AlternateContent xmlns:mc="http://schemas.openxmlformats.org/markup-compatibility/2006" xmlns:p14="http://schemas.microsoft.com/office/powerpoint/2010/main">
+    <mc:Choice Requires="p14">
+      <p:transition spd="med" p14:dur="700">
+        <p:fade/>
+      </p:transition>
+    </mc:Choice>
+    <mc:Fallback xmlns="">
+      <p:transition spd="med">
+        <p:fade/>
+      </p:transition>
+    </mc:Fallback>
+  </mc:AlternateContent>
+</p:sld>
+</file>
+
+<file path=ppt/slides/slide27.xml><?xml version="1.0" encoding="utf-8"?>
+<p:sld xmlns:a="http://schemas.openxmlformats.org/drawingml/2006/main" xmlns:r="http://schemas.openxmlformats.org/officeDocument/2006/relationships" xmlns:p="http://schemas.openxmlformats.org/presentationml/2006/main">
+  <p:cSld>
+    <p:spTree>
+      <p:nvGrpSpPr>
+        <p:cNvPr id="1" name=""/>
+        <p:cNvGrpSpPr/>
+        <p:nvPr/>
+      </p:nvGrpSpPr>
+      <p:grpSpPr>
+        <a:xfrm>
+          <a:off x="0" y="0"/>
+          <a:ext cx="0" cy="0"/>
+          <a:chOff x="0" y="0"/>
+          <a:chExt cx="0" cy="0"/>
+        </a:xfrm>
+      </p:grpSpPr>
+      <p:sp>
+        <p:nvSpPr>
+          <p:cNvPr id="2" name="Title 1"/>
+          <p:cNvSpPr>
+            <a:spLocks noGrp="1"/>
+          </p:cNvSpPr>
+          <p:nvPr>
+            <p:ph type="title"/>
+          </p:nvPr>
+        </p:nvSpPr>
+        <p:spPr>
+          <a:xfrm>
+            <a:off x="1289107" y="251670"/>
+            <a:ext cx="9601200" cy="622184"/>
+          </a:xfrm>
+        </p:spPr>
+        <p:txBody>
+          <a:bodyPr/>
+          <a:lstStyle/>
+          <a:p>
+            <a:r>
+              <a:rPr lang="en-US" dirty="0"/>
+              <a:t>K-Means – </a:t>
+            </a:r>
+            <a:r>
+              <a:rPr lang="en-US" dirty="0" err="1"/>
+              <a:t>Parâmetros</a:t>
+            </a:r>
+            <a:r>
+              <a:rPr lang="en-US" dirty="0"/>
+              <a:t> Default</a:t>
+            </a:r>
+          </a:p>
+        </p:txBody>
+      </p:sp>
+      <p:sp>
+        <p:nvSpPr>
+          <p:cNvPr id="9" name="Content Placeholder 3">
+            <a:extLst>
+              <a:ext uri="{FF2B5EF4-FFF2-40B4-BE49-F238E27FC236}">
+                <a16:creationId xmlns:a16="http://schemas.microsoft.com/office/drawing/2014/main" id="{7252E61A-240E-8143-B9AD-A29D0456F0BC}"/>
+              </a:ext>
+            </a:extLst>
+          </p:cNvPr>
+          <p:cNvSpPr txBox="1">
+            <a:spLocks/>
+          </p:cNvSpPr>
+          <p:nvPr/>
+        </p:nvSpPr>
+        <p:spPr>
+          <a:xfrm>
+            <a:off x="1290506" y="998290"/>
+            <a:ext cx="9601200" cy="5100506"/>
+          </a:xfrm>
+          <a:prstGeom prst="rect">
+            <a:avLst/>
+          </a:prstGeom>
+        </p:spPr>
+        <p:txBody>
+          <a:bodyPr vert="horz" lIns="91440" tIns="45720" rIns="91440" bIns="45720" rtlCol="0">
+            <a:normAutofit/>
+          </a:bodyPr>
+          <a:lstStyle>
+            <a:lvl1pPr marL="228600" indent="-228600" algn="l" defTabSz="914400" rtl="0" eaLnBrk="1" latinLnBrk="0" hangingPunct="1">
+              <a:lnSpc>
+                <a:spcPct val="90000"/>
+              </a:lnSpc>
+              <a:spcBef>
+                <a:spcPts val="1800"/>
+              </a:spcBef>
+              <a:buClr>
+                <a:schemeClr val="accent1">
+                  <a:lumMod val="75000"/>
+                </a:schemeClr>
+              </a:buClr>
+              <a:buSzPct val="100000"/>
+              <a:buFont typeface="Arial" pitchFamily="34" charset="0"/>
+              <a:buChar char="▪"/>
+              <a:defRPr sz="2000" kern="1200">
+                <a:solidFill>
+                  <a:schemeClr val="tx1"/>
+                </a:solidFill>
+                <a:latin typeface="+mn-lt"/>
+                <a:ea typeface="+mn-ea"/>
+                <a:cs typeface="+mn-cs"/>
+              </a:defRPr>
+            </a:lvl1pPr>
+            <a:lvl2pPr marL="457200" indent="-182880" algn="l" defTabSz="914400" rtl="0" eaLnBrk="1" latinLnBrk="0" hangingPunct="1">
+              <a:lnSpc>
+                <a:spcPct val="90000"/>
+              </a:lnSpc>
+              <a:spcBef>
+                <a:spcPts val="1200"/>
+              </a:spcBef>
+              <a:buClr>
+                <a:schemeClr val="accent1">
+                  <a:lumMod val="75000"/>
+                </a:schemeClr>
+              </a:buClr>
+              <a:buSzPct val="100000"/>
+              <a:buFont typeface="Arial" pitchFamily="34" charset="0"/>
+              <a:buChar char="▪"/>
+              <a:defRPr sz="1800" kern="1200">
+                <a:solidFill>
+                  <a:schemeClr val="tx1"/>
+                </a:solidFill>
+                <a:latin typeface="+mn-lt"/>
+                <a:ea typeface="+mn-ea"/>
+                <a:cs typeface="+mn-cs"/>
+              </a:defRPr>
+            </a:lvl2pPr>
+            <a:lvl3pPr marL="685800" indent="-179388" algn="l" defTabSz="914400" rtl="0" eaLnBrk="1" latinLnBrk="0" hangingPunct="1">
+              <a:lnSpc>
+                <a:spcPct val="90000"/>
+              </a:lnSpc>
+              <a:spcBef>
+                <a:spcPts val="800"/>
+              </a:spcBef>
+              <a:buClr>
+                <a:schemeClr val="accent1">
+                  <a:lumMod val="75000"/>
+                </a:schemeClr>
+              </a:buClr>
+              <a:buSzPct val="100000"/>
+              <a:buFont typeface="Arial" pitchFamily="34" charset="0"/>
+              <a:buChar char="▪"/>
+              <a:defRPr sz="1600" kern="1200">
+                <a:solidFill>
+                  <a:schemeClr val="tx1"/>
+                </a:solidFill>
+                <a:latin typeface="+mn-lt"/>
+                <a:ea typeface="+mn-ea"/>
+                <a:cs typeface="+mn-cs"/>
+              </a:defRPr>
+            </a:lvl3pPr>
+            <a:lvl4pPr marL="914400" indent="-182880" algn="l" defTabSz="914400" rtl="0" eaLnBrk="1" latinLnBrk="0" hangingPunct="1">
+              <a:lnSpc>
+                <a:spcPct val="90000"/>
+              </a:lnSpc>
+              <a:spcBef>
+                <a:spcPts val="800"/>
+              </a:spcBef>
+              <a:buClr>
+                <a:schemeClr val="accent1">
+                  <a:lumMod val="75000"/>
+                </a:schemeClr>
+              </a:buClr>
+              <a:buSzPct val="100000"/>
+              <a:buFont typeface="Arial" pitchFamily="34" charset="0"/>
+              <a:buChar char="▪"/>
+              <a:defRPr sz="1400" kern="1200">
+                <a:solidFill>
+                  <a:schemeClr val="tx1"/>
+                </a:solidFill>
+                <a:latin typeface="+mn-lt"/>
+                <a:ea typeface="+mn-ea"/>
+                <a:cs typeface="+mn-cs"/>
+              </a:defRPr>
+            </a:lvl4pPr>
+            <a:lvl5pPr marL="1143000" indent="-179388" algn="l" defTabSz="914400" rtl="0" eaLnBrk="1" latinLnBrk="0" hangingPunct="1">
+              <a:lnSpc>
+                <a:spcPct val="90000"/>
+              </a:lnSpc>
+              <a:spcBef>
+                <a:spcPts val="600"/>
+              </a:spcBef>
+              <a:buClr>
+                <a:schemeClr val="accent1">
+                  <a:lumMod val="75000"/>
+                </a:schemeClr>
+              </a:buClr>
+              <a:buSzPct val="100000"/>
+              <a:buFont typeface="Arial" pitchFamily="34" charset="0"/>
+              <a:buChar char="▪"/>
+              <a:defRPr sz="1400" kern="1200">
+                <a:solidFill>
+                  <a:schemeClr val="tx1"/>
+                </a:solidFill>
+                <a:latin typeface="+mn-lt"/>
+                <a:ea typeface="+mn-ea"/>
+                <a:cs typeface="+mn-cs"/>
+              </a:defRPr>
+            </a:lvl5pPr>
+            <a:lvl6pPr marL="1371600" indent="-182880" algn="l" defTabSz="914400" rtl="0" eaLnBrk="1" latinLnBrk="0" hangingPunct="1">
+              <a:lnSpc>
+                <a:spcPct val="90000"/>
+              </a:lnSpc>
+              <a:spcBef>
+                <a:spcPts val="600"/>
+              </a:spcBef>
+              <a:buClr>
+                <a:schemeClr val="accent1">
+                  <a:lumMod val="75000"/>
+                </a:schemeClr>
+              </a:buClr>
+              <a:buSzPct val="100000"/>
+              <a:buFont typeface="Arial" pitchFamily="34" charset="0"/>
+              <a:buChar char="▪"/>
+              <a:defRPr sz="1400" kern="1200">
+                <a:solidFill>
+                  <a:schemeClr val="tx1"/>
+                </a:solidFill>
+                <a:latin typeface="+mn-lt"/>
+                <a:ea typeface="+mn-ea"/>
+                <a:cs typeface="+mn-cs"/>
+              </a:defRPr>
+            </a:lvl6pPr>
+            <a:lvl7pPr marL="1600200" indent="-179388" algn="l" defTabSz="914400" rtl="0" eaLnBrk="1" latinLnBrk="0" hangingPunct="1">
+              <a:lnSpc>
+                <a:spcPct val="90000"/>
+              </a:lnSpc>
+              <a:spcBef>
+                <a:spcPts val="600"/>
+              </a:spcBef>
+              <a:buClr>
+                <a:schemeClr val="accent1">
+                  <a:lumMod val="75000"/>
+                </a:schemeClr>
+              </a:buClr>
+              <a:buSzPct val="100000"/>
+              <a:buFont typeface="Arial" pitchFamily="34" charset="0"/>
+              <a:buChar char="▪"/>
+              <a:defRPr sz="1400" kern="1200">
+                <a:solidFill>
+                  <a:schemeClr val="tx1"/>
+                </a:solidFill>
+                <a:latin typeface="+mn-lt"/>
+                <a:ea typeface="+mn-ea"/>
+                <a:cs typeface="+mn-cs"/>
+              </a:defRPr>
+            </a:lvl7pPr>
+            <a:lvl8pPr marL="1828800" indent="-182880" algn="l" defTabSz="914400" rtl="0" eaLnBrk="1" latinLnBrk="0" hangingPunct="1">
+              <a:lnSpc>
+                <a:spcPct val="90000"/>
+              </a:lnSpc>
+              <a:spcBef>
+                <a:spcPts val="600"/>
+              </a:spcBef>
+              <a:buClr>
+                <a:schemeClr val="accent1">
+                  <a:lumMod val="75000"/>
+                </a:schemeClr>
+              </a:buClr>
+              <a:buSzPct val="100000"/>
+              <a:buFont typeface="Arial" pitchFamily="34" charset="0"/>
+              <a:buChar char="▪"/>
+              <a:defRPr sz="1400" kern="1200">
+                <a:solidFill>
+                  <a:schemeClr val="tx1"/>
+                </a:solidFill>
+                <a:latin typeface="+mn-lt"/>
+                <a:ea typeface="+mn-ea"/>
+                <a:cs typeface="+mn-cs"/>
+              </a:defRPr>
+            </a:lvl8pPr>
+            <a:lvl9pPr marL="1878012" indent="0" algn="l" defTabSz="914400" rtl="0" eaLnBrk="1" latinLnBrk="0" hangingPunct="1">
+              <a:lnSpc>
+                <a:spcPct val="90000"/>
+              </a:lnSpc>
+              <a:spcBef>
+                <a:spcPts val="600"/>
+              </a:spcBef>
+              <a:buClr>
+                <a:schemeClr val="accent1">
+                  <a:lumMod val="75000"/>
+                </a:schemeClr>
+              </a:buClr>
+              <a:buSzPct val="100000"/>
+              <a:buFont typeface="Arial" pitchFamily="34" charset="0"/>
+              <a:buNone/>
+              <a:defRPr sz="1400" kern="1200">
+                <a:solidFill>
+                  <a:schemeClr val="tx1"/>
+                </a:solidFill>
+                <a:latin typeface="+mn-lt"/>
+                <a:ea typeface="+mn-ea"/>
+                <a:cs typeface="+mn-cs"/>
+              </a:defRPr>
+            </a:lvl9pPr>
+          </a:lstStyle>
+          <a:p>
             <a:pPr lvl="1"/>
             <a:r>
               <a:rPr lang="pt-PT" dirty="0"/>
@@ -23793,7 +24664,7 @@
 </p:sld>
 </file>
 
-<file path=ppt/slides/slide27.xml><?xml version="1.0" encoding="utf-8"?>
+<file path=ppt/slides/slide28.xml><?xml version="1.0" encoding="utf-8"?>
 <p:sld xmlns:a="http://schemas.openxmlformats.org/drawingml/2006/main" xmlns:r="http://schemas.openxmlformats.org/officeDocument/2006/relationships" xmlns:p="http://schemas.openxmlformats.org/presentationml/2006/main">
   <p:cSld>
     <p:spTree>
@@ -24215,7 +25086,7 @@
 </p:sld>
 </file>
 
-<file path=ppt/slides/slide28.xml><?xml version="1.0" encoding="utf-8"?>
+<file path=ppt/slides/slide29.xml><?xml version="1.0" encoding="utf-8"?>
 <p:sld xmlns:a="http://schemas.openxmlformats.org/drawingml/2006/main" xmlns:r="http://schemas.openxmlformats.org/officeDocument/2006/relationships" xmlns:p="http://schemas.openxmlformats.org/presentationml/2006/main">
   <p:cSld>
     <p:spTree>
@@ -24572,7 +25443,197 @@
 </p:sld>
 </file>
 
-<file path=ppt/slides/slide29.xml><?xml version="1.0" encoding="utf-8"?>
+<file path=ppt/slides/slide3.xml><?xml version="1.0" encoding="utf-8"?>
+<p:sld xmlns:a="http://schemas.openxmlformats.org/drawingml/2006/main" xmlns:r="http://schemas.openxmlformats.org/officeDocument/2006/relationships" xmlns:p="http://schemas.openxmlformats.org/presentationml/2006/main">
+  <p:cSld>
+    <p:spTree>
+      <p:nvGrpSpPr>
+        <p:cNvPr id="1" name=""/>
+        <p:cNvGrpSpPr/>
+        <p:nvPr/>
+      </p:nvGrpSpPr>
+      <p:grpSpPr>
+        <a:xfrm>
+          <a:off x="0" y="0"/>
+          <a:ext cx="0" cy="0"/>
+          <a:chOff x="0" y="0"/>
+          <a:chExt cx="0" cy="0"/>
+        </a:xfrm>
+      </p:grpSpPr>
+      <p:sp>
+        <p:nvSpPr>
+          <p:cNvPr id="2" name="Title 1"/>
+          <p:cNvSpPr>
+            <a:spLocks noGrp="1"/>
+          </p:cNvSpPr>
+          <p:nvPr>
+            <p:ph type="title"/>
+          </p:nvPr>
+        </p:nvSpPr>
+        <p:spPr>
+          <a:xfrm>
+            <a:off x="1289107" y="251670"/>
+            <a:ext cx="9601200" cy="622184"/>
+          </a:xfrm>
+        </p:spPr>
+        <p:txBody>
+          <a:bodyPr/>
+          <a:lstStyle/>
+          <a:p>
+            <a:r>
+              <a:rPr lang="en-US" dirty="0" err="1"/>
+              <a:t>Parâmetros</a:t>
+            </a:r>
+            <a:r>
+              <a:rPr lang="en-US" dirty="0"/>
+              <a:t> Default</a:t>
+            </a:r>
+          </a:p>
+        </p:txBody>
+      </p:sp>
+      <p:sp>
+        <p:nvSpPr>
+          <p:cNvPr id="4" name="Content Placeholder 3">
+            <a:extLst>
+              <a:ext uri="{FF2B5EF4-FFF2-40B4-BE49-F238E27FC236}">
+                <a16:creationId xmlns:a16="http://schemas.microsoft.com/office/drawing/2014/main" id="{432B73FB-9237-82A3-F7EE-2EE0C67A46DA}"/>
+              </a:ext>
+            </a:extLst>
+          </p:cNvPr>
+          <p:cNvSpPr>
+            <a:spLocks noGrp="1"/>
+          </p:cNvSpPr>
+          <p:nvPr>
+            <p:ph idx="1"/>
+          </p:nvPr>
+        </p:nvSpPr>
+        <p:spPr>
+          <a:xfrm>
+            <a:off x="1290506" y="998290"/>
+            <a:ext cx="9601200" cy="4599963"/>
+          </a:xfrm>
+        </p:spPr>
+        <p:txBody>
+          <a:bodyPr>
+            <a:normAutofit/>
+          </a:bodyPr>
+          <a:lstStyle/>
+          <a:p>
+            <a:r>
+              <a:rPr lang="en-US" dirty="0" err="1"/>
+              <a:t>Esta</a:t>
+            </a:r>
+            <a:r>
+              <a:rPr lang="en-US" dirty="0"/>
+              <a:t> </a:t>
+            </a:r>
+            <a:r>
+              <a:rPr lang="en-US" dirty="0" err="1"/>
+              <a:t>vai</a:t>
+            </a:r>
+            <a:r>
+              <a:rPr lang="en-US" dirty="0"/>
+              <a:t> ser a </a:t>
+            </a:r>
+            <a:r>
+              <a:rPr lang="en-US" dirty="0" err="1"/>
+              <a:t>primeira</a:t>
+            </a:r>
+            <a:r>
+              <a:rPr lang="en-US" dirty="0"/>
+              <a:t> mining structure a ser </a:t>
+            </a:r>
+            <a:r>
+              <a:rPr lang="en-US" dirty="0" err="1"/>
+              <a:t>testada</a:t>
+            </a:r>
+            <a:r>
+              <a:rPr lang="en-US" dirty="0"/>
+              <a:t>, </a:t>
+            </a:r>
+            <a:r>
+              <a:rPr lang="en-US" dirty="0" err="1"/>
+              <a:t>utilizando</a:t>
+            </a:r>
+            <a:r>
+              <a:rPr lang="en-US" dirty="0"/>
+              <a:t> </a:t>
+            </a:r>
+            <a:r>
+              <a:rPr lang="en-US" dirty="0" err="1"/>
+              <a:t>os</a:t>
+            </a:r>
+            <a:r>
+              <a:rPr lang="en-US" dirty="0"/>
+              <a:t> inputs </a:t>
+            </a:r>
+            <a:r>
+              <a:rPr lang="en-US" dirty="0" err="1"/>
+              <a:t>sugeridos</a:t>
+            </a:r>
+            <a:r>
+              <a:rPr lang="en-US" dirty="0"/>
+              <a:t>. </a:t>
+            </a:r>
+          </a:p>
+          <a:p>
+            <a:r>
+              <a:rPr lang="pt-PT" dirty="0"/>
+              <a:t>Alguns inputs foram removidos porque não faziam sentido ou porque forneciam informação repetida, ou seja, os mesmos resultados eram obtidos com ambos os inputs.</a:t>
+            </a:r>
+          </a:p>
+          <a:p>
+            <a:r>
+              <a:rPr lang="pt-PT" dirty="0"/>
+              <a:t>Os inputs finais foram age, maritualstatus, education, sex, capitalgain, capitalloss, hoursperweek e occupation inicialmente tudo “discrete”.</a:t>
+            </a:r>
+          </a:p>
+          <a:p>
+            <a:r>
+              <a:rPr lang="pt-PT" dirty="0"/>
+              <a:t>Os dados "capitalloss" e "capitalgain" exigem uma análise mais aprofundada, pois envolvem fatores que podem variar a cada ano. Por exemplo, pode ser que alguém venda uma propriedade ou não, ou que tenha bons ou maus investimentos. Por isso, é importante levar esses aspectos em consideração ao usá-los como inputs.</a:t>
+            </a:r>
+          </a:p>
+          <a:p>
+            <a:r>
+              <a:rPr lang="pt-PT" dirty="0"/>
+              <a:t>O dataset foi divido como pedido, 70% dos dados para treino e 30% para teste.</a:t>
+            </a:r>
+          </a:p>
+          <a:p>
+            <a:pPr marL="0" indent="0">
+              <a:buNone/>
+            </a:pPr>
+            <a:endParaRPr lang="pt-PT" dirty="0"/>
+          </a:p>
+        </p:txBody>
+      </p:sp>
+    </p:spTree>
+    <p:extLst>
+      <p:ext uri="{BB962C8B-B14F-4D97-AF65-F5344CB8AC3E}">
+        <p14:creationId xmlns:p14="http://schemas.microsoft.com/office/powerpoint/2010/main" val="1972885686"/>
+      </p:ext>
+    </p:extLst>
+  </p:cSld>
+  <p:clrMapOvr>
+    <a:masterClrMapping/>
+  </p:clrMapOvr>
+  <mc:AlternateContent xmlns:mc="http://schemas.openxmlformats.org/markup-compatibility/2006" xmlns:p14="http://schemas.microsoft.com/office/powerpoint/2010/main">
+    <mc:Choice Requires="p14">
+      <p:transition spd="med" p14:dur="700">
+        <p:fade/>
+      </p:transition>
+    </mc:Choice>
+    <mc:Fallback xmlns="">
+      <p:transition spd="med">
+        <p:fade/>
+      </p:transition>
+    </mc:Fallback>
+  </mc:AlternateContent>
+</p:sld>
+</file>
+
+<file path=ppt/slides/slide30.xml><?xml version="1.0" encoding="utf-8"?>
 <p:sld xmlns:a="http://schemas.openxmlformats.org/drawingml/2006/main" xmlns:r="http://schemas.openxmlformats.org/officeDocument/2006/relationships" xmlns:p="http://schemas.openxmlformats.org/presentationml/2006/main">
   <p:cSld>
     <p:spTree>
@@ -24955,197 +26016,7 @@
 </p:sld>
 </file>
 
-<file path=ppt/slides/slide3.xml><?xml version="1.0" encoding="utf-8"?>
-<p:sld xmlns:a="http://schemas.openxmlformats.org/drawingml/2006/main" xmlns:r="http://schemas.openxmlformats.org/officeDocument/2006/relationships" xmlns:p="http://schemas.openxmlformats.org/presentationml/2006/main">
-  <p:cSld>
-    <p:spTree>
-      <p:nvGrpSpPr>
-        <p:cNvPr id="1" name=""/>
-        <p:cNvGrpSpPr/>
-        <p:nvPr/>
-      </p:nvGrpSpPr>
-      <p:grpSpPr>
-        <a:xfrm>
-          <a:off x="0" y="0"/>
-          <a:ext cx="0" cy="0"/>
-          <a:chOff x="0" y="0"/>
-          <a:chExt cx="0" cy="0"/>
-        </a:xfrm>
-      </p:grpSpPr>
-      <p:sp>
-        <p:nvSpPr>
-          <p:cNvPr id="2" name="Title 1"/>
-          <p:cNvSpPr>
-            <a:spLocks noGrp="1"/>
-          </p:cNvSpPr>
-          <p:nvPr>
-            <p:ph type="title"/>
-          </p:nvPr>
-        </p:nvSpPr>
-        <p:spPr>
-          <a:xfrm>
-            <a:off x="1289107" y="251670"/>
-            <a:ext cx="9601200" cy="622184"/>
-          </a:xfrm>
-        </p:spPr>
-        <p:txBody>
-          <a:bodyPr/>
-          <a:lstStyle/>
-          <a:p>
-            <a:r>
-              <a:rPr lang="en-US" dirty="0" err="1"/>
-              <a:t>Parâmetros</a:t>
-            </a:r>
-            <a:r>
-              <a:rPr lang="en-US" dirty="0"/>
-              <a:t> Default</a:t>
-            </a:r>
-          </a:p>
-        </p:txBody>
-      </p:sp>
-      <p:sp>
-        <p:nvSpPr>
-          <p:cNvPr id="4" name="Content Placeholder 3">
-            <a:extLst>
-              <a:ext uri="{FF2B5EF4-FFF2-40B4-BE49-F238E27FC236}">
-                <a16:creationId xmlns:a16="http://schemas.microsoft.com/office/drawing/2014/main" id="{432B73FB-9237-82A3-F7EE-2EE0C67A46DA}"/>
-              </a:ext>
-            </a:extLst>
-          </p:cNvPr>
-          <p:cNvSpPr>
-            <a:spLocks noGrp="1"/>
-          </p:cNvSpPr>
-          <p:nvPr>
-            <p:ph idx="1"/>
-          </p:nvPr>
-        </p:nvSpPr>
-        <p:spPr>
-          <a:xfrm>
-            <a:off x="1290506" y="998290"/>
-            <a:ext cx="9601200" cy="4599963"/>
-          </a:xfrm>
-        </p:spPr>
-        <p:txBody>
-          <a:bodyPr>
-            <a:normAutofit/>
-          </a:bodyPr>
-          <a:lstStyle/>
-          <a:p>
-            <a:r>
-              <a:rPr lang="en-US" dirty="0" err="1"/>
-              <a:t>Esta</a:t>
-            </a:r>
-            <a:r>
-              <a:rPr lang="en-US" dirty="0"/>
-              <a:t> </a:t>
-            </a:r>
-            <a:r>
-              <a:rPr lang="en-US" dirty="0" err="1"/>
-              <a:t>vai</a:t>
-            </a:r>
-            <a:r>
-              <a:rPr lang="en-US" dirty="0"/>
-              <a:t> ser a </a:t>
-            </a:r>
-            <a:r>
-              <a:rPr lang="en-US" dirty="0" err="1"/>
-              <a:t>primeira</a:t>
-            </a:r>
-            <a:r>
-              <a:rPr lang="en-US" dirty="0"/>
-              <a:t> mining structure a ser </a:t>
-            </a:r>
-            <a:r>
-              <a:rPr lang="en-US" dirty="0" err="1"/>
-              <a:t>testada</a:t>
-            </a:r>
-            <a:r>
-              <a:rPr lang="en-US" dirty="0"/>
-              <a:t>, </a:t>
-            </a:r>
-            <a:r>
-              <a:rPr lang="en-US" dirty="0" err="1"/>
-              <a:t>utilizando</a:t>
-            </a:r>
-            <a:r>
-              <a:rPr lang="en-US" dirty="0"/>
-              <a:t> </a:t>
-            </a:r>
-            <a:r>
-              <a:rPr lang="en-US" dirty="0" err="1"/>
-              <a:t>os</a:t>
-            </a:r>
-            <a:r>
-              <a:rPr lang="en-US" dirty="0"/>
-              <a:t> inputs </a:t>
-            </a:r>
-            <a:r>
-              <a:rPr lang="en-US" dirty="0" err="1"/>
-              <a:t>sugeridos</a:t>
-            </a:r>
-            <a:r>
-              <a:rPr lang="en-US" dirty="0"/>
-              <a:t>. </a:t>
-            </a:r>
-          </a:p>
-          <a:p>
-            <a:r>
-              <a:rPr lang="pt-PT" dirty="0"/>
-              <a:t>Alguns inputs foram removidos porque não faziam sentido ou porque forneciam informação repetida, ou seja, os mesmos resultados eram obtidos com ambos os inputs.</a:t>
-            </a:r>
-          </a:p>
-          <a:p>
-            <a:r>
-              <a:rPr lang="pt-PT" dirty="0"/>
-              <a:t>Os inputs finais foram age, maritualstatus, education, sex, capitalgain, capitalloss, hoursperweek e occupation inicialmente tudo “discrete”.</a:t>
-            </a:r>
-          </a:p>
-          <a:p>
-            <a:r>
-              <a:rPr lang="pt-PT" dirty="0"/>
-              <a:t>Os dados "capitalloss" e "capitalgain" exigem uma análise mais aprofundada, pois envolvem fatores que podem variar a cada ano. Por exemplo, pode ser que alguém venda uma propriedade ou não, ou que tenha bons ou maus investimentos. Por isso, é importante levar esses aspectos em consideração ao usá-los como inputs.</a:t>
-            </a:r>
-          </a:p>
-          <a:p>
-            <a:r>
-              <a:rPr lang="pt-PT" dirty="0"/>
-              <a:t>O dataset foi divido como pedido, 70% dos dados para treino e 30% para teste.</a:t>
-            </a:r>
-          </a:p>
-          <a:p>
-            <a:pPr marL="0" indent="0">
-              <a:buNone/>
-            </a:pPr>
-            <a:endParaRPr lang="pt-PT" dirty="0"/>
-          </a:p>
-        </p:txBody>
-      </p:sp>
-    </p:spTree>
-    <p:extLst>
-      <p:ext uri="{BB962C8B-B14F-4D97-AF65-F5344CB8AC3E}">
-        <p14:creationId xmlns:p14="http://schemas.microsoft.com/office/powerpoint/2010/main" val="1972885686"/>
-      </p:ext>
-    </p:extLst>
-  </p:cSld>
-  <p:clrMapOvr>
-    <a:masterClrMapping/>
-  </p:clrMapOvr>
-  <mc:AlternateContent xmlns:mc="http://schemas.openxmlformats.org/markup-compatibility/2006" xmlns:p14="http://schemas.microsoft.com/office/powerpoint/2010/main">
-    <mc:Choice Requires="p14">
-      <p:transition spd="med" p14:dur="700">
-        <p:fade/>
-      </p:transition>
-    </mc:Choice>
-    <mc:Fallback xmlns="">
-      <p:transition spd="med">
-        <p:fade/>
-      </p:transition>
-    </mc:Fallback>
-  </mc:AlternateContent>
-</p:sld>
-</file>
-
-<file path=ppt/slides/slide30.xml><?xml version="1.0" encoding="utf-8"?>
+<file path=ppt/slides/slide31.xml><?xml version="1.0" encoding="utf-8"?>
 <p:sld xmlns:a="http://schemas.openxmlformats.org/drawingml/2006/main" xmlns:r="http://schemas.openxmlformats.org/officeDocument/2006/relationships" xmlns:p="http://schemas.openxmlformats.org/presentationml/2006/main">
   <p:cSld>
     <p:spTree>
@@ -25507,7 +26378,7 @@
 </p:sld>
 </file>
 
-<file path=ppt/slides/slide31.xml><?xml version="1.0" encoding="utf-8"?>
+<file path=ppt/slides/slide32.xml><?xml version="1.0" encoding="utf-8"?>
 <p:sld xmlns:a="http://schemas.openxmlformats.org/drawingml/2006/main" xmlns:r="http://schemas.openxmlformats.org/officeDocument/2006/relationships" xmlns:p="http://schemas.openxmlformats.org/presentationml/2006/main">
   <p:cSld>
     <p:spTree>

</xml_diff>